<commit_message>
Implement a maven plugin to manage parcels
</commit_message>
<xml_diff>
--- a/cloudera-framework-archetype/src/main/resources/archetype-resources/src/site/resources/Archetype_Architecture.pptx
+++ b/cloudera-framework-archetype/src/main/resources/archetype-resources/src/site/resources/Archetype_Architecture.pptx
@@ -5,16 +5,17 @@
     <p:sldMasterId id="2147483790" r:id="rId1"/>
   </p:sldMasterIdLst>
   <p:notesMasterIdLst>
-    <p:notesMasterId r:id="rId9"/>
+    <p:notesMasterId r:id="rId10"/>
   </p:notesMasterIdLst>
   <p:sldIdLst>
     <p:sldId id="256" r:id="rId2"/>
     <p:sldId id="349" r:id="rId3"/>
     <p:sldId id="341" r:id="rId4"/>
-    <p:sldId id="346" r:id="rId5"/>
-    <p:sldId id="347" r:id="rId6"/>
-    <p:sldId id="350" r:id="rId7"/>
-    <p:sldId id="315" r:id="rId8"/>
+    <p:sldId id="351" r:id="rId5"/>
+    <p:sldId id="346" r:id="rId6"/>
+    <p:sldId id="347" r:id="rId7"/>
+    <p:sldId id="350" r:id="rId8"/>
+    <p:sldId id="315" r:id="rId9"/>
   </p:sldIdLst>
   <p:sldSz cx="12188825" cy="6858000"/>
   <p:notesSz cx="6858000" cy="9144000"/>
@@ -198,7 +199,7 @@
           <a:p>
             <a:fld id="{C5389D1C-CB14-984D-9CE7-9AA778768F1D}" type="datetimeFigureOut">
               <a:rPr lang="en-US" smtClean="0"/>
-              <a:t>08/10/15</a:t>
+              <a:t>18/12/15</a:t>
             </a:fld>
             <a:endParaRPr lang="en-GB"/>
           </a:p>
@@ -26470,6 +26471,4624 @@
           <a:chExt cx="0" cy="0"/>
         </a:xfrm>
       </p:grpSpPr>
+      <p:grpSp>
+        <p:nvGrpSpPr>
+          <p:cNvPr id="101" name="Group 100"/>
+          <p:cNvGrpSpPr/>
+          <p:nvPr/>
+        </p:nvGrpSpPr>
+        <p:grpSpPr>
+          <a:xfrm>
+            <a:off x="621804" y="3835622"/>
+            <a:ext cx="1019700" cy="2192804"/>
+            <a:chOff x="6958508" y="1164188"/>
+            <a:chExt cx="1019700" cy="2192804"/>
+          </a:xfrm>
+        </p:grpSpPr>
+        <p:sp>
+          <p:nvSpPr>
+            <p:cNvPr id="102" name="Rounded Rectangle 101"/>
+            <p:cNvSpPr/>
+            <p:nvPr/>
+          </p:nvSpPr>
+          <p:spPr>
+            <a:xfrm>
+              <a:off x="6958508" y="1164188"/>
+              <a:ext cx="1019700" cy="2192804"/>
+            </a:xfrm>
+            <a:prstGeom prst="roundRect">
+              <a:avLst>
+                <a:gd name="adj" fmla="val 8610"/>
+              </a:avLst>
+            </a:prstGeom>
+            <a:solidFill>
+              <a:schemeClr val="bg1">
+                <a:lumMod val="85000"/>
+              </a:schemeClr>
+            </a:solidFill>
+            <a:ln w="38100" cmpd="sng">
+              <a:noFill/>
+            </a:ln>
+          </p:spPr>
+          <p:style>
+            <a:lnRef idx="2">
+              <a:schemeClr val="dk1"/>
+            </a:lnRef>
+            <a:fillRef idx="1">
+              <a:schemeClr val="lt1"/>
+            </a:fillRef>
+            <a:effectRef idx="0">
+              <a:schemeClr val="dk1"/>
+            </a:effectRef>
+            <a:fontRef idx="minor">
+              <a:schemeClr val="dk1"/>
+            </a:fontRef>
+          </p:style>
+          <p:txBody>
+            <a:bodyPr tIns="0" rtlCol="0" anchor="t" anchorCtr="0"/>
+            <a:lstStyle/>
+            <a:p>
+              <a:pPr algn="ctr"/>
+              <a:r>
+                <a:rPr lang="en-US" sz="1400" dirty="0" smtClean="0">
+                  <a:cs typeface="Calibri Light"/>
+                </a:rPr>
+                <a:t>Dev Node</a:t>
+              </a:r>
+              <a:endParaRPr lang="en-US" sz="1400" dirty="0" smtClean="0">
+                <a:cs typeface="Calibri Light"/>
+              </a:endParaRPr>
+            </a:p>
+          </p:txBody>
+        </p:sp>
+        <p:sp>
+          <p:nvSpPr>
+            <p:cNvPr id="103" name="Rounded Rectangle 102"/>
+            <p:cNvSpPr/>
+            <p:nvPr/>
+          </p:nvSpPr>
+          <p:spPr>
+            <a:xfrm>
+              <a:off x="7067532" y="1489541"/>
+              <a:ext cx="801652" cy="236223"/>
+            </a:xfrm>
+            <a:prstGeom prst="roundRect">
+              <a:avLst/>
+            </a:prstGeom>
+            <a:solidFill>
+              <a:schemeClr val="tx2"/>
+            </a:solidFill>
+            <a:ln>
+              <a:solidFill>
+                <a:schemeClr val="tx2"/>
+              </a:solidFill>
+            </a:ln>
+          </p:spPr>
+          <p:style>
+            <a:lnRef idx="2">
+              <a:schemeClr val="dk1">
+                <a:shade val="50000"/>
+              </a:schemeClr>
+            </a:lnRef>
+            <a:fillRef idx="1">
+              <a:schemeClr val="dk1"/>
+            </a:fillRef>
+            <a:effectRef idx="0">
+              <a:schemeClr val="dk1"/>
+            </a:effectRef>
+            <a:fontRef idx="minor">
+              <a:schemeClr val="lt1"/>
+            </a:fontRef>
+          </p:style>
+          <p:txBody>
+            <a:bodyPr rtlCol="0" anchor="ctr"/>
+            <a:lstStyle/>
+            <a:p>
+              <a:pPr algn="ctr"/>
+              <a:r>
+                <a:rPr lang="en-US" sz="1000" dirty="0" smtClean="0">
+                  <a:cs typeface="Calibri Light"/>
+                </a:rPr>
+                <a:t>Develop</a:t>
+              </a:r>
+              <a:endParaRPr lang="en-US" sz="1000" dirty="0">
+                <a:solidFill>
+                  <a:srgbClr val="29A7DE"/>
+                </a:solidFill>
+                <a:cs typeface="Calibri Light"/>
+              </a:endParaRPr>
+            </a:p>
+          </p:txBody>
+        </p:sp>
+        <p:sp>
+          <p:nvSpPr>
+            <p:cNvPr id="104" name="Rounded Rectangle 103"/>
+            <p:cNvSpPr/>
+            <p:nvPr/>
+          </p:nvSpPr>
+          <p:spPr>
+            <a:xfrm>
+              <a:off x="7067532" y="1797530"/>
+              <a:ext cx="801652" cy="236223"/>
+            </a:xfrm>
+            <a:prstGeom prst="roundRect">
+              <a:avLst/>
+            </a:prstGeom>
+            <a:solidFill>
+              <a:schemeClr val="tx2"/>
+            </a:solidFill>
+            <a:ln>
+              <a:solidFill>
+                <a:schemeClr val="tx2"/>
+              </a:solidFill>
+            </a:ln>
+          </p:spPr>
+          <p:style>
+            <a:lnRef idx="2">
+              <a:schemeClr val="dk1">
+                <a:shade val="50000"/>
+              </a:schemeClr>
+            </a:lnRef>
+            <a:fillRef idx="1">
+              <a:schemeClr val="dk1"/>
+            </a:fillRef>
+            <a:effectRef idx="0">
+              <a:schemeClr val="dk1"/>
+            </a:effectRef>
+            <a:fontRef idx="minor">
+              <a:schemeClr val="lt1"/>
+            </a:fontRef>
+          </p:style>
+          <p:txBody>
+            <a:bodyPr rtlCol="0" anchor="ctr"/>
+            <a:lstStyle/>
+            <a:p>
+              <a:pPr algn="ctr"/>
+              <a:r>
+                <a:rPr lang="en-US" sz="1000" dirty="0" smtClean="0">
+                  <a:cs typeface="Calibri Light"/>
+                </a:rPr>
+                <a:t>Build</a:t>
+              </a:r>
+              <a:endParaRPr lang="en-US" sz="1000" dirty="0">
+                <a:solidFill>
+                  <a:srgbClr val="29A7DE"/>
+                </a:solidFill>
+                <a:cs typeface="Calibri Light"/>
+              </a:endParaRPr>
+            </a:p>
+          </p:txBody>
+        </p:sp>
+        <p:sp>
+          <p:nvSpPr>
+            <p:cNvPr id="105" name="Rounded Rectangle 104"/>
+            <p:cNvSpPr/>
+            <p:nvPr/>
+          </p:nvSpPr>
+          <p:spPr>
+            <a:xfrm>
+              <a:off x="7067532" y="2105519"/>
+              <a:ext cx="801652" cy="236223"/>
+            </a:xfrm>
+            <a:prstGeom prst="roundRect">
+              <a:avLst/>
+            </a:prstGeom>
+            <a:solidFill>
+              <a:schemeClr val="tx2"/>
+            </a:solidFill>
+            <a:ln>
+              <a:solidFill>
+                <a:schemeClr val="tx2"/>
+              </a:solidFill>
+            </a:ln>
+          </p:spPr>
+          <p:style>
+            <a:lnRef idx="2">
+              <a:schemeClr val="dk1">
+                <a:shade val="50000"/>
+              </a:schemeClr>
+            </a:lnRef>
+            <a:fillRef idx="1">
+              <a:schemeClr val="dk1"/>
+            </a:fillRef>
+            <a:effectRef idx="0">
+              <a:schemeClr val="dk1"/>
+            </a:effectRef>
+            <a:fontRef idx="minor">
+              <a:schemeClr val="lt1"/>
+            </a:fontRef>
+          </p:style>
+          <p:txBody>
+            <a:bodyPr rtlCol="0" anchor="ctr"/>
+            <a:lstStyle/>
+            <a:p>
+              <a:pPr algn="ctr"/>
+              <a:r>
+                <a:rPr lang="en-US" sz="1000" dirty="0" smtClean="0">
+                  <a:cs typeface="Calibri Light"/>
+                </a:rPr>
+                <a:t>Unit Test</a:t>
+              </a:r>
+              <a:endParaRPr lang="en-US" sz="1000" dirty="0">
+                <a:solidFill>
+                  <a:srgbClr val="29A7DE"/>
+                </a:solidFill>
+                <a:cs typeface="Calibri Light"/>
+              </a:endParaRPr>
+            </a:p>
+          </p:txBody>
+        </p:sp>
+        <p:sp>
+          <p:nvSpPr>
+            <p:cNvPr id="106" name="Rounded Rectangle 105"/>
+            <p:cNvSpPr/>
+            <p:nvPr/>
+          </p:nvSpPr>
+          <p:spPr>
+            <a:xfrm>
+              <a:off x="7067532" y="2413508"/>
+              <a:ext cx="801652" cy="236223"/>
+            </a:xfrm>
+            <a:prstGeom prst="roundRect">
+              <a:avLst/>
+            </a:prstGeom>
+            <a:solidFill>
+              <a:schemeClr val="tx2"/>
+            </a:solidFill>
+            <a:ln>
+              <a:solidFill>
+                <a:schemeClr val="tx2"/>
+              </a:solidFill>
+            </a:ln>
+          </p:spPr>
+          <p:style>
+            <a:lnRef idx="2">
+              <a:schemeClr val="dk1">
+                <a:shade val="50000"/>
+              </a:schemeClr>
+            </a:lnRef>
+            <a:fillRef idx="1">
+              <a:schemeClr val="dk1"/>
+            </a:fillRef>
+            <a:effectRef idx="0">
+              <a:schemeClr val="dk1"/>
+            </a:effectRef>
+            <a:fontRef idx="minor">
+              <a:schemeClr val="lt1"/>
+            </a:fontRef>
+          </p:style>
+          <p:txBody>
+            <a:bodyPr rtlCol="0" anchor="ctr"/>
+            <a:lstStyle/>
+            <a:p>
+              <a:pPr algn="ctr"/>
+              <a:r>
+                <a:rPr lang="en-US" sz="1000" dirty="0" smtClean="0">
+                  <a:cs typeface="Calibri Light"/>
+                </a:rPr>
+                <a:t>Deploy</a:t>
+              </a:r>
+              <a:endParaRPr lang="en-US" sz="1000" dirty="0">
+                <a:solidFill>
+                  <a:srgbClr val="29A7DE"/>
+                </a:solidFill>
+                <a:cs typeface="Calibri Light"/>
+              </a:endParaRPr>
+            </a:p>
+          </p:txBody>
+        </p:sp>
+        <p:sp>
+          <p:nvSpPr>
+            <p:cNvPr id="107" name="Rounded Rectangle 106"/>
+            <p:cNvSpPr/>
+            <p:nvPr/>
+          </p:nvSpPr>
+          <p:spPr>
+            <a:xfrm>
+              <a:off x="7067532" y="2721497"/>
+              <a:ext cx="801652" cy="236223"/>
+            </a:xfrm>
+            <a:prstGeom prst="roundRect">
+              <a:avLst/>
+            </a:prstGeom>
+            <a:solidFill>
+              <a:schemeClr val="tx2"/>
+            </a:solidFill>
+            <a:ln>
+              <a:solidFill>
+                <a:schemeClr val="tx2"/>
+              </a:solidFill>
+            </a:ln>
+          </p:spPr>
+          <p:style>
+            <a:lnRef idx="2">
+              <a:schemeClr val="dk1">
+                <a:shade val="50000"/>
+              </a:schemeClr>
+            </a:lnRef>
+            <a:fillRef idx="1">
+              <a:schemeClr val="dk1"/>
+            </a:fillRef>
+            <a:effectRef idx="0">
+              <a:schemeClr val="dk1"/>
+            </a:effectRef>
+            <a:fontRef idx="minor">
+              <a:schemeClr val="lt1"/>
+            </a:fontRef>
+          </p:style>
+          <p:txBody>
+            <a:bodyPr rtlCol="0" anchor="ctr"/>
+            <a:lstStyle/>
+            <a:p>
+              <a:pPr algn="ctr"/>
+              <a:r>
+                <a:rPr lang="en-US" sz="1000" dirty="0" smtClean="0">
+                  <a:cs typeface="Calibri Light"/>
+                </a:rPr>
+                <a:t>Synth Data</a:t>
+              </a:r>
+              <a:endParaRPr lang="en-US" sz="1000" dirty="0">
+                <a:solidFill>
+                  <a:srgbClr val="29A7DE"/>
+                </a:solidFill>
+                <a:cs typeface="Calibri Light"/>
+              </a:endParaRPr>
+            </a:p>
+          </p:txBody>
+        </p:sp>
+        <p:sp>
+          <p:nvSpPr>
+            <p:cNvPr id="108" name="Rounded Rectangle 107"/>
+            <p:cNvSpPr/>
+            <p:nvPr/>
+          </p:nvSpPr>
+          <p:spPr>
+            <a:xfrm>
+              <a:off x="7067532" y="3029486"/>
+              <a:ext cx="801652" cy="236223"/>
+            </a:xfrm>
+            <a:prstGeom prst="roundRect">
+              <a:avLst/>
+            </a:prstGeom>
+            <a:solidFill>
+              <a:schemeClr val="tx2"/>
+            </a:solidFill>
+            <a:ln>
+              <a:solidFill>
+                <a:schemeClr val="tx2"/>
+              </a:solidFill>
+            </a:ln>
+          </p:spPr>
+          <p:style>
+            <a:lnRef idx="2">
+              <a:schemeClr val="dk1">
+                <a:shade val="50000"/>
+              </a:schemeClr>
+            </a:lnRef>
+            <a:fillRef idx="1">
+              <a:schemeClr val="dk1"/>
+            </a:fillRef>
+            <a:effectRef idx="0">
+              <a:schemeClr val="dk1"/>
+            </a:effectRef>
+            <a:fontRef idx="minor">
+              <a:schemeClr val="lt1"/>
+            </a:fontRef>
+          </p:style>
+          <p:txBody>
+            <a:bodyPr rtlCol="0" anchor="ctr"/>
+            <a:lstStyle/>
+            <a:p>
+              <a:pPr algn="ctr"/>
+              <a:r>
+                <a:rPr lang="en-US" sz="1000" dirty="0" smtClean="0">
+                  <a:cs typeface="Calibri Light"/>
+                </a:rPr>
+                <a:t>Sub Data</a:t>
+              </a:r>
+              <a:endParaRPr lang="en-US" sz="1000" dirty="0">
+                <a:solidFill>
+                  <a:srgbClr val="29A7DE"/>
+                </a:solidFill>
+                <a:cs typeface="Calibri Light"/>
+              </a:endParaRPr>
+            </a:p>
+          </p:txBody>
+        </p:sp>
+      </p:grpSp>
+      <p:sp>
+        <p:nvSpPr>
+          <p:cNvPr id="2" name="Title 1"/>
+          <p:cNvSpPr>
+            <a:spLocks noGrp="1"/>
+          </p:cNvSpPr>
+          <p:nvPr>
+            <p:ph type="title"/>
+          </p:nvPr>
+        </p:nvSpPr>
+        <p:spPr/>
+        <p:txBody>
+          <a:bodyPr/>
+          <a:lstStyle/>
+          <a:p>
+            <a:r>
+              <a:rPr lang="en-GB" dirty="0" smtClean="0"/>
+              <a:t>Continuous Integration &amp; Delivery</a:t>
+            </a:r>
+            <a:endParaRPr lang="en-GB" dirty="0"/>
+          </a:p>
+        </p:txBody>
+      </p:sp>
+      <p:grpSp>
+        <p:nvGrpSpPr>
+          <p:cNvPr id="3" name="Group 2"/>
+          <p:cNvGrpSpPr/>
+          <p:nvPr/>
+        </p:nvGrpSpPr>
+        <p:grpSpPr>
+          <a:xfrm>
+            <a:off x="10979368" y="188640"/>
+            <a:ext cx="1019700" cy="1278000"/>
+            <a:chOff x="11019833" y="134776"/>
+            <a:chExt cx="1019700" cy="1278000"/>
+          </a:xfrm>
+        </p:grpSpPr>
+        <p:sp>
+          <p:nvSpPr>
+            <p:cNvPr id="4" name="Rounded Rectangle 3"/>
+            <p:cNvSpPr/>
+            <p:nvPr/>
+          </p:nvSpPr>
+          <p:spPr>
+            <a:xfrm>
+              <a:off x="11019833" y="134776"/>
+              <a:ext cx="1019700" cy="1278000"/>
+            </a:xfrm>
+            <a:prstGeom prst="roundRect">
+              <a:avLst>
+                <a:gd name="adj" fmla="val 8610"/>
+              </a:avLst>
+            </a:prstGeom>
+            <a:solidFill>
+              <a:schemeClr val="bg1">
+                <a:lumMod val="85000"/>
+              </a:schemeClr>
+            </a:solidFill>
+            <a:ln w="38100" cmpd="sng">
+              <a:noFill/>
+            </a:ln>
+          </p:spPr>
+          <p:style>
+            <a:lnRef idx="2">
+              <a:schemeClr val="dk1"/>
+            </a:lnRef>
+            <a:fillRef idx="1">
+              <a:schemeClr val="lt1"/>
+            </a:fillRef>
+            <a:effectRef idx="0">
+              <a:schemeClr val="dk1"/>
+            </a:effectRef>
+            <a:fontRef idx="minor">
+              <a:schemeClr val="dk1"/>
+            </a:fontRef>
+          </p:style>
+          <p:txBody>
+            <a:bodyPr tIns="0" rtlCol="0" anchor="t" anchorCtr="0"/>
+            <a:lstStyle/>
+            <a:p>
+              <a:pPr algn="ctr"/>
+              <a:r>
+                <a:rPr lang="en-US" sz="1400" dirty="0" smtClean="0">
+                  <a:cs typeface="Calibri Light"/>
+                </a:rPr>
+                <a:t>Context</a:t>
+              </a:r>
+            </a:p>
+          </p:txBody>
+        </p:sp>
+        <p:sp>
+          <p:nvSpPr>
+            <p:cNvPr id="5" name="Rounded Rectangle 4"/>
+            <p:cNvSpPr/>
+            <p:nvPr/>
+          </p:nvSpPr>
+          <p:spPr>
+            <a:xfrm>
+              <a:off x="11128857" y="460130"/>
+              <a:ext cx="801652" cy="236223"/>
+            </a:xfrm>
+            <a:prstGeom prst="roundRect">
+              <a:avLst/>
+            </a:prstGeom>
+            <a:solidFill>
+              <a:schemeClr val="tx2"/>
+            </a:solidFill>
+            <a:ln>
+              <a:solidFill>
+                <a:schemeClr val="tx2"/>
+              </a:solidFill>
+            </a:ln>
+          </p:spPr>
+          <p:style>
+            <a:lnRef idx="2">
+              <a:schemeClr val="dk1">
+                <a:shade val="50000"/>
+              </a:schemeClr>
+            </a:lnRef>
+            <a:fillRef idx="1">
+              <a:schemeClr val="dk1"/>
+            </a:fillRef>
+            <a:effectRef idx="0">
+              <a:schemeClr val="dk1"/>
+            </a:effectRef>
+            <a:fontRef idx="minor">
+              <a:schemeClr val="lt1"/>
+            </a:fontRef>
+          </p:style>
+          <p:txBody>
+            <a:bodyPr rtlCol="0" anchor="ctr"/>
+            <a:lstStyle/>
+            <a:p>
+              <a:pPr algn="ctr"/>
+              <a:r>
+                <a:rPr lang="en-US" sz="1000" dirty="0" smtClean="0">
+                  <a:cs typeface="Calibri Light"/>
+                </a:rPr>
+                <a:t>SLA</a:t>
+              </a:r>
+              <a:endParaRPr lang="en-US" sz="1000" dirty="0">
+                <a:solidFill>
+                  <a:srgbClr val="29A7DE"/>
+                </a:solidFill>
+                <a:cs typeface="Calibri Light"/>
+              </a:endParaRPr>
+            </a:p>
+          </p:txBody>
+        </p:sp>
+        <p:sp>
+          <p:nvSpPr>
+            <p:cNvPr id="6" name="Rounded Rectangle 5"/>
+            <p:cNvSpPr/>
+            <p:nvPr/>
+          </p:nvSpPr>
+          <p:spPr>
+            <a:xfrm>
+              <a:off x="11128857" y="768119"/>
+              <a:ext cx="801652" cy="236223"/>
+            </a:xfrm>
+            <a:prstGeom prst="roundRect">
+              <a:avLst/>
+            </a:prstGeom>
+            <a:solidFill>
+              <a:srgbClr val="0078D9"/>
+            </a:solidFill>
+            <a:ln>
+              <a:solidFill>
+                <a:srgbClr val="0078D9"/>
+              </a:solidFill>
+            </a:ln>
+          </p:spPr>
+          <p:style>
+            <a:lnRef idx="2">
+              <a:schemeClr val="dk1">
+                <a:shade val="50000"/>
+              </a:schemeClr>
+            </a:lnRef>
+            <a:fillRef idx="1">
+              <a:schemeClr val="dk1"/>
+            </a:fillRef>
+            <a:effectRef idx="0">
+              <a:schemeClr val="dk1"/>
+            </a:effectRef>
+            <a:fontRef idx="minor">
+              <a:schemeClr val="lt1"/>
+            </a:fontRef>
+          </p:style>
+          <p:txBody>
+            <a:bodyPr rtlCol="0" anchor="ctr"/>
+            <a:lstStyle/>
+            <a:p>
+              <a:pPr algn="ctr"/>
+              <a:r>
+                <a:rPr lang="en-US" sz="1000" dirty="0" smtClean="0">
+                  <a:cs typeface="Calibri Light"/>
+                </a:rPr>
+                <a:t>Non-SLA</a:t>
+              </a:r>
+              <a:endParaRPr lang="en-US" sz="1000" dirty="0">
+                <a:solidFill>
+                  <a:srgbClr val="29A7DE"/>
+                </a:solidFill>
+                <a:cs typeface="Calibri Light"/>
+              </a:endParaRPr>
+            </a:p>
+          </p:txBody>
+        </p:sp>
+        <p:sp>
+          <p:nvSpPr>
+            <p:cNvPr id="7" name="Rounded Rectangle 6"/>
+            <p:cNvSpPr/>
+            <p:nvPr/>
+          </p:nvSpPr>
+          <p:spPr>
+            <a:xfrm>
+              <a:off x="11128857" y="1076108"/>
+              <a:ext cx="801652" cy="236223"/>
+            </a:xfrm>
+            <a:prstGeom prst="roundRect">
+              <a:avLst/>
+            </a:prstGeom>
+            <a:solidFill>
+              <a:schemeClr val="tx1"/>
+            </a:solidFill>
+            <a:ln>
+              <a:solidFill>
+                <a:schemeClr val="tx1"/>
+              </a:solidFill>
+            </a:ln>
+          </p:spPr>
+          <p:style>
+            <a:lnRef idx="2">
+              <a:schemeClr val="dk1">
+                <a:shade val="50000"/>
+              </a:schemeClr>
+            </a:lnRef>
+            <a:fillRef idx="1">
+              <a:schemeClr val="dk1"/>
+            </a:fillRef>
+            <a:effectRef idx="0">
+              <a:schemeClr val="dk1"/>
+            </a:effectRef>
+            <a:fontRef idx="minor">
+              <a:schemeClr val="lt1"/>
+            </a:fontRef>
+          </p:style>
+          <p:txBody>
+            <a:bodyPr rtlCol="0" anchor="ctr"/>
+            <a:lstStyle/>
+            <a:p>
+              <a:pPr algn="ctr"/>
+              <a:r>
+                <a:rPr lang="en-US" sz="1000" dirty="0" smtClean="0">
+                  <a:cs typeface="Calibri Light"/>
+                </a:rPr>
+                <a:t>Ancillary</a:t>
+              </a:r>
+              <a:endParaRPr lang="en-US" sz="1000" dirty="0">
+                <a:solidFill>
+                  <a:srgbClr val="29A7DE"/>
+                </a:solidFill>
+                <a:cs typeface="Calibri Light"/>
+              </a:endParaRPr>
+            </a:p>
+          </p:txBody>
+        </p:sp>
+      </p:grpSp>
+      <p:grpSp>
+        <p:nvGrpSpPr>
+          <p:cNvPr id="13" name="Group 12"/>
+          <p:cNvGrpSpPr/>
+          <p:nvPr/>
+        </p:nvGrpSpPr>
+        <p:grpSpPr>
+          <a:xfrm>
+            <a:off x="10144424" y="4154624"/>
+            <a:ext cx="1019700" cy="1873802"/>
+            <a:chOff x="10144424" y="4154624"/>
+            <a:chExt cx="1019700" cy="1873802"/>
+          </a:xfrm>
+        </p:grpSpPr>
+        <p:sp>
+          <p:nvSpPr>
+            <p:cNvPr id="396" name="Rounded Rectangle 395"/>
+            <p:cNvSpPr/>
+            <p:nvPr/>
+          </p:nvSpPr>
+          <p:spPr>
+            <a:xfrm>
+              <a:off x="10144424" y="4154624"/>
+              <a:ext cx="1019700" cy="1873802"/>
+            </a:xfrm>
+            <a:prstGeom prst="roundRect">
+              <a:avLst>
+                <a:gd name="adj" fmla="val 8610"/>
+              </a:avLst>
+            </a:prstGeom>
+            <a:solidFill>
+              <a:schemeClr val="bg1">
+                <a:lumMod val="85000"/>
+              </a:schemeClr>
+            </a:solidFill>
+            <a:ln w="38100" cmpd="sng">
+              <a:noFill/>
+            </a:ln>
+          </p:spPr>
+          <p:style>
+            <a:lnRef idx="2">
+              <a:schemeClr val="dk1"/>
+            </a:lnRef>
+            <a:fillRef idx="1">
+              <a:schemeClr val="lt1"/>
+            </a:fillRef>
+            <a:effectRef idx="0">
+              <a:schemeClr val="dk1"/>
+            </a:effectRef>
+            <a:fontRef idx="minor">
+              <a:schemeClr val="dk1"/>
+            </a:fontRef>
+          </p:style>
+          <p:txBody>
+            <a:bodyPr tIns="0" rtlCol="0" anchor="t" anchorCtr="0"/>
+            <a:lstStyle/>
+            <a:p>
+              <a:pPr algn="ctr"/>
+              <a:r>
+                <a:rPr lang="en-US" sz="1400" dirty="0">
+                  <a:cs typeface="Calibri Light"/>
+                </a:rPr>
+                <a:t>Prod Clstr</a:t>
+              </a:r>
+            </a:p>
+          </p:txBody>
+        </p:sp>
+        <p:sp>
+          <p:nvSpPr>
+            <p:cNvPr id="398" name="Rounded Rectangle 397"/>
+            <p:cNvSpPr/>
+            <p:nvPr/>
+          </p:nvSpPr>
+          <p:spPr>
+            <a:xfrm>
+              <a:off x="10253448" y="4468964"/>
+              <a:ext cx="801652" cy="236223"/>
+            </a:xfrm>
+            <a:prstGeom prst="roundRect">
+              <a:avLst/>
+            </a:prstGeom>
+            <a:solidFill>
+              <a:srgbClr val="0078D9"/>
+            </a:solidFill>
+            <a:ln>
+              <a:solidFill>
+                <a:srgbClr val="0078D9"/>
+              </a:solidFill>
+            </a:ln>
+          </p:spPr>
+          <p:style>
+            <a:lnRef idx="2">
+              <a:schemeClr val="dk1">
+                <a:shade val="50000"/>
+              </a:schemeClr>
+            </a:lnRef>
+            <a:fillRef idx="1">
+              <a:schemeClr val="dk1"/>
+            </a:fillRef>
+            <a:effectRef idx="0">
+              <a:schemeClr val="dk1"/>
+            </a:effectRef>
+            <a:fontRef idx="minor">
+              <a:schemeClr val="lt1"/>
+            </a:fontRef>
+          </p:style>
+          <p:txBody>
+            <a:bodyPr rtlCol="0" anchor="ctr"/>
+            <a:lstStyle/>
+            <a:p>
+              <a:pPr algn="ctr"/>
+              <a:r>
+                <a:rPr lang="en-US" sz="1000" dirty="0" smtClean="0">
+                  <a:cs typeface="Calibri Light"/>
+                </a:rPr>
+                <a:t>Prod SLA</a:t>
+              </a:r>
+              <a:endParaRPr lang="en-US" sz="1000" dirty="0">
+                <a:solidFill>
+                  <a:srgbClr val="29A7DE"/>
+                </a:solidFill>
+                <a:cs typeface="Calibri Light"/>
+              </a:endParaRPr>
+            </a:p>
+          </p:txBody>
+        </p:sp>
+        <p:sp>
+          <p:nvSpPr>
+            <p:cNvPr id="399" name="Rounded Rectangle 398"/>
+            <p:cNvSpPr/>
+            <p:nvPr/>
+          </p:nvSpPr>
+          <p:spPr>
+            <a:xfrm>
+              <a:off x="10253448" y="4776953"/>
+              <a:ext cx="801652" cy="236223"/>
+            </a:xfrm>
+            <a:prstGeom prst="roundRect">
+              <a:avLst/>
+            </a:prstGeom>
+            <a:solidFill>
+              <a:srgbClr val="0078D9"/>
+            </a:solidFill>
+            <a:ln>
+              <a:solidFill>
+                <a:srgbClr val="0078D9"/>
+              </a:solidFill>
+            </a:ln>
+          </p:spPr>
+          <p:style>
+            <a:lnRef idx="2">
+              <a:schemeClr val="dk1">
+                <a:shade val="50000"/>
+              </a:schemeClr>
+            </a:lnRef>
+            <a:fillRef idx="1">
+              <a:schemeClr val="dk1"/>
+            </a:fillRef>
+            <a:effectRef idx="0">
+              <a:schemeClr val="dk1"/>
+            </a:effectRef>
+            <a:fontRef idx="minor">
+              <a:schemeClr val="lt1"/>
+            </a:fontRef>
+          </p:style>
+          <p:txBody>
+            <a:bodyPr rtlCol="0" anchor="ctr"/>
+            <a:lstStyle/>
+            <a:p>
+              <a:pPr algn="ctr"/>
+              <a:r>
+                <a:rPr lang="en-US" sz="1000" dirty="0" smtClean="0">
+                  <a:cs typeface="Calibri Light"/>
+                </a:rPr>
+                <a:t>Ingest SLA</a:t>
+              </a:r>
+              <a:endParaRPr lang="en-US" sz="1000" dirty="0">
+                <a:solidFill>
+                  <a:srgbClr val="29A7DE"/>
+                </a:solidFill>
+                <a:cs typeface="Calibri Light"/>
+              </a:endParaRPr>
+            </a:p>
+          </p:txBody>
+        </p:sp>
+        <p:sp>
+          <p:nvSpPr>
+            <p:cNvPr id="400" name="Rounded Rectangle 399"/>
+            <p:cNvSpPr/>
+            <p:nvPr/>
+          </p:nvSpPr>
+          <p:spPr>
+            <a:xfrm>
+              <a:off x="10253448" y="5084942"/>
+              <a:ext cx="801652" cy="236223"/>
+            </a:xfrm>
+            <a:prstGeom prst="roundRect">
+              <a:avLst/>
+            </a:prstGeom>
+            <a:solidFill>
+              <a:srgbClr val="0078D9"/>
+            </a:solidFill>
+            <a:ln>
+              <a:solidFill>
+                <a:srgbClr val="0078D9"/>
+              </a:solidFill>
+            </a:ln>
+          </p:spPr>
+          <p:style>
+            <a:lnRef idx="2">
+              <a:schemeClr val="dk1">
+                <a:shade val="50000"/>
+              </a:schemeClr>
+            </a:lnRef>
+            <a:fillRef idx="1">
+              <a:schemeClr val="dk1"/>
+            </a:fillRef>
+            <a:effectRef idx="0">
+              <a:schemeClr val="dk1"/>
+            </a:effectRef>
+            <a:fontRef idx="minor">
+              <a:schemeClr val="lt1"/>
+            </a:fontRef>
+          </p:style>
+          <p:txBody>
+            <a:bodyPr rtlCol="0" anchor="ctr"/>
+            <a:lstStyle/>
+            <a:p>
+              <a:pPr algn="ctr"/>
+              <a:r>
+                <a:rPr lang="en-US" sz="1000" dirty="0" smtClean="0">
+                  <a:cs typeface="Calibri Light"/>
+                </a:rPr>
+                <a:t>Monitor</a:t>
+              </a:r>
+              <a:endParaRPr lang="en-US" sz="1000" dirty="0">
+                <a:solidFill>
+                  <a:srgbClr val="29A7DE"/>
+                </a:solidFill>
+                <a:cs typeface="Calibri Light"/>
+              </a:endParaRPr>
+            </a:p>
+          </p:txBody>
+        </p:sp>
+        <p:sp>
+          <p:nvSpPr>
+            <p:cNvPr id="401" name="Rounded Rectangle 400"/>
+            <p:cNvSpPr/>
+            <p:nvPr/>
+          </p:nvSpPr>
+          <p:spPr>
+            <a:xfrm>
+              <a:off x="10253448" y="5392931"/>
+              <a:ext cx="801652" cy="236223"/>
+            </a:xfrm>
+            <a:prstGeom prst="roundRect">
+              <a:avLst/>
+            </a:prstGeom>
+            <a:solidFill>
+              <a:srgbClr val="0078D9"/>
+            </a:solidFill>
+            <a:ln>
+              <a:solidFill>
+                <a:srgbClr val="0078D9"/>
+              </a:solidFill>
+            </a:ln>
+          </p:spPr>
+          <p:style>
+            <a:lnRef idx="2">
+              <a:schemeClr val="dk1">
+                <a:shade val="50000"/>
+              </a:schemeClr>
+            </a:lnRef>
+            <a:fillRef idx="1">
+              <a:schemeClr val="dk1"/>
+            </a:fillRef>
+            <a:effectRef idx="0">
+              <a:schemeClr val="dk1"/>
+            </a:effectRef>
+            <a:fontRef idx="minor">
+              <a:schemeClr val="lt1"/>
+            </a:fontRef>
+          </p:style>
+          <p:txBody>
+            <a:bodyPr rtlCol="0" anchor="ctr"/>
+            <a:lstStyle/>
+            <a:p>
+              <a:pPr algn="ctr"/>
+              <a:r>
+                <a:rPr lang="en-US" sz="1000" dirty="0" smtClean="0">
+                  <a:cs typeface="Calibri Light"/>
+                </a:rPr>
+                <a:t>Prod Data</a:t>
+              </a:r>
+              <a:endParaRPr lang="en-US" sz="1000" dirty="0">
+                <a:solidFill>
+                  <a:srgbClr val="29A7DE"/>
+                </a:solidFill>
+                <a:cs typeface="Calibri Light"/>
+              </a:endParaRPr>
+            </a:p>
+          </p:txBody>
+        </p:sp>
+        <p:sp>
+          <p:nvSpPr>
+            <p:cNvPr id="402" name="Rounded Rectangle 401"/>
+            <p:cNvSpPr/>
+            <p:nvPr/>
+          </p:nvSpPr>
+          <p:spPr>
+            <a:xfrm>
+              <a:off x="10253448" y="5700920"/>
+              <a:ext cx="801652" cy="236223"/>
+            </a:xfrm>
+            <a:prstGeom prst="roundRect">
+              <a:avLst/>
+            </a:prstGeom>
+            <a:solidFill>
+              <a:srgbClr val="0078D9"/>
+            </a:solidFill>
+            <a:ln>
+              <a:solidFill>
+                <a:srgbClr val="0078D9"/>
+              </a:solidFill>
+            </a:ln>
+          </p:spPr>
+          <p:style>
+            <a:lnRef idx="2">
+              <a:schemeClr val="dk1">
+                <a:shade val="50000"/>
+              </a:schemeClr>
+            </a:lnRef>
+            <a:fillRef idx="1">
+              <a:schemeClr val="dk1"/>
+            </a:fillRef>
+            <a:effectRef idx="0">
+              <a:schemeClr val="dk1"/>
+            </a:effectRef>
+            <a:fontRef idx="minor">
+              <a:schemeClr val="lt1"/>
+            </a:fontRef>
+          </p:style>
+          <p:txBody>
+            <a:bodyPr rtlCol="0" anchor="ctr"/>
+            <a:lstStyle/>
+            <a:p>
+              <a:pPr algn="ctr"/>
+              <a:r>
+                <a:rPr lang="en-US" sz="1000" dirty="0" smtClean="0">
+                  <a:cs typeface="Calibri Light"/>
+                </a:rPr>
+                <a:t>Manager</a:t>
+              </a:r>
+              <a:endParaRPr lang="en-US" sz="1000" dirty="0">
+                <a:solidFill>
+                  <a:srgbClr val="29A7DE"/>
+                </a:solidFill>
+                <a:cs typeface="Calibri Light"/>
+              </a:endParaRPr>
+            </a:p>
+          </p:txBody>
+        </p:sp>
+      </p:grpSp>
+      <p:cxnSp>
+        <p:nvCxnSpPr>
+          <p:cNvPr id="404" name="Straight Arrow Connector 255"/>
+          <p:cNvCxnSpPr>
+            <a:stCxn id="152" idx="2"/>
+            <a:endCxn id="123" idx="2"/>
+          </p:cNvCxnSpPr>
+          <p:nvPr/>
+        </p:nvCxnSpPr>
+        <p:spPr>
+          <a:xfrm rot="16200000" flipH="1">
+            <a:off x="7797488" y="5076164"/>
+            <a:ext cx="12700" cy="1904524"/>
+          </a:xfrm>
+          <a:prstGeom prst="bentConnector3">
+            <a:avLst>
+              <a:gd name="adj1" fmla="val 1800000"/>
+            </a:avLst>
+          </a:prstGeom>
+          <a:ln w="12700">
+            <a:solidFill>
+              <a:schemeClr val="tx1"/>
+            </a:solidFill>
+            <a:headEnd type="triangle"/>
+            <a:tailEnd type="none"/>
+          </a:ln>
+          <a:effectLst/>
+        </p:spPr>
+        <p:style>
+          <a:lnRef idx="2">
+            <a:schemeClr val="accent1"/>
+          </a:lnRef>
+          <a:fillRef idx="0">
+            <a:schemeClr val="accent1"/>
+          </a:fillRef>
+          <a:effectRef idx="1">
+            <a:schemeClr val="accent1"/>
+          </a:effectRef>
+          <a:fontRef idx="minor">
+            <a:schemeClr val="tx1"/>
+          </a:fontRef>
+        </p:style>
+      </p:cxnSp>
+      <p:grpSp>
+        <p:nvGrpSpPr>
+          <p:cNvPr id="575" name="Group 574"/>
+          <p:cNvGrpSpPr/>
+          <p:nvPr/>
+        </p:nvGrpSpPr>
+        <p:grpSpPr>
+          <a:xfrm>
+            <a:off x="2998068" y="2809581"/>
+            <a:ext cx="1019700" cy="666000"/>
+            <a:chOff x="8464884" y="2698114"/>
+            <a:chExt cx="1019700" cy="666000"/>
+          </a:xfrm>
+        </p:grpSpPr>
+        <p:sp>
+          <p:nvSpPr>
+            <p:cNvPr id="576" name="Rounded Rectangle 575"/>
+            <p:cNvSpPr/>
+            <p:nvPr/>
+          </p:nvSpPr>
+          <p:spPr>
+            <a:xfrm>
+              <a:off x="8464884" y="2698114"/>
+              <a:ext cx="1019700" cy="666000"/>
+            </a:xfrm>
+            <a:prstGeom prst="roundRect">
+              <a:avLst>
+                <a:gd name="adj" fmla="val 8610"/>
+              </a:avLst>
+            </a:prstGeom>
+            <a:solidFill>
+              <a:schemeClr val="bg1">
+                <a:lumMod val="85000"/>
+              </a:schemeClr>
+            </a:solidFill>
+            <a:ln w="38100" cmpd="sng">
+              <a:noFill/>
+            </a:ln>
+          </p:spPr>
+          <p:style>
+            <a:lnRef idx="2">
+              <a:schemeClr val="dk1"/>
+            </a:lnRef>
+            <a:fillRef idx="1">
+              <a:schemeClr val="lt1"/>
+            </a:fillRef>
+            <a:effectRef idx="0">
+              <a:schemeClr val="dk1"/>
+            </a:effectRef>
+            <a:fontRef idx="minor">
+              <a:schemeClr val="dk1"/>
+            </a:fontRef>
+          </p:style>
+          <p:txBody>
+            <a:bodyPr tIns="0" rtlCol="0" anchor="t" anchorCtr="0"/>
+            <a:lstStyle/>
+            <a:p>
+              <a:pPr algn="ctr"/>
+              <a:r>
+                <a:rPr lang="en-US" sz="1400" dirty="0" smtClean="0">
+                  <a:cs typeface="Calibri Light"/>
+                </a:rPr>
+                <a:t>Cloudera</a:t>
+              </a:r>
+              <a:endParaRPr lang="en-US" sz="1600" dirty="0" smtClean="0">
+                <a:cs typeface="Calibri Light"/>
+              </a:endParaRPr>
+            </a:p>
+          </p:txBody>
+        </p:sp>
+        <p:sp>
+          <p:nvSpPr>
+            <p:cNvPr id="577" name="Rounded Rectangle 576"/>
+            <p:cNvSpPr/>
+            <p:nvPr/>
+          </p:nvSpPr>
+          <p:spPr>
+            <a:xfrm>
+              <a:off x="8571932" y="3007869"/>
+              <a:ext cx="801653" cy="236223"/>
+            </a:xfrm>
+            <a:prstGeom prst="roundRect">
+              <a:avLst/>
+            </a:prstGeom>
+            <a:solidFill>
+              <a:srgbClr val="005586"/>
+            </a:solidFill>
+            <a:ln>
+              <a:solidFill>
+                <a:srgbClr val="005586"/>
+              </a:solidFill>
+            </a:ln>
+          </p:spPr>
+          <p:style>
+            <a:lnRef idx="2">
+              <a:schemeClr val="dk1">
+                <a:shade val="50000"/>
+              </a:schemeClr>
+            </a:lnRef>
+            <a:fillRef idx="1">
+              <a:schemeClr val="dk1"/>
+            </a:fillRef>
+            <a:effectRef idx="0">
+              <a:schemeClr val="dk1"/>
+            </a:effectRef>
+            <a:fontRef idx="minor">
+              <a:schemeClr val="lt1"/>
+            </a:fontRef>
+          </p:style>
+          <p:txBody>
+            <a:bodyPr rtlCol="0" anchor="ctr"/>
+            <a:lstStyle/>
+            <a:p>
+              <a:pPr algn="ctr"/>
+              <a:r>
+                <a:rPr lang="en-US" sz="1000" dirty="0" smtClean="0">
+                  <a:cs typeface="Calibri Light"/>
+                </a:rPr>
+                <a:t>Support</a:t>
+              </a:r>
+              <a:endParaRPr lang="en-US" sz="1000" dirty="0">
+                <a:solidFill>
+                  <a:srgbClr val="29A7DE"/>
+                </a:solidFill>
+                <a:cs typeface="Calibri Light"/>
+              </a:endParaRPr>
+            </a:p>
+          </p:txBody>
+        </p:sp>
+      </p:grpSp>
+      <p:grpSp>
+        <p:nvGrpSpPr>
+          <p:cNvPr id="578" name="Group 577"/>
+          <p:cNvGrpSpPr/>
+          <p:nvPr/>
+        </p:nvGrpSpPr>
+        <p:grpSpPr>
+          <a:xfrm>
+            <a:off x="4222204" y="2506721"/>
+            <a:ext cx="1019700" cy="968860"/>
+            <a:chOff x="405780" y="1290494"/>
+            <a:chExt cx="1019700" cy="968860"/>
+          </a:xfrm>
+        </p:grpSpPr>
+        <p:sp>
+          <p:nvSpPr>
+            <p:cNvPr id="579" name="Rounded Rectangle 578"/>
+            <p:cNvSpPr/>
+            <p:nvPr/>
+          </p:nvSpPr>
+          <p:spPr>
+            <a:xfrm>
+              <a:off x="405780" y="1290494"/>
+              <a:ext cx="1019700" cy="968860"/>
+            </a:xfrm>
+            <a:prstGeom prst="roundRect">
+              <a:avLst>
+                <a:gd name="adj" fmla="val 8610"/>
+              </a:avLst>
+            </a:prstGeom>
+            <a:solidFill>
+              <a:schemeClr val="bg1">
+                <a:lumMod val="85000"/>
+              </a:schemeClr>
+            </a:solidFill>
+            <a:ln w="38100" cmpd="sng">
+              <a:noFill/>
+            </a:ln>
+          </p:spPr>
+          <p:style>
+            <a:lnRef idx="2">
+              <a:schemeClr val="dk1"/>
+            </a:lnRef>
+            <a:fillRef idx="1">
+              <a:schemeClr val="lt1"/>
+            </a:fillRef>
+            <a:effectRef idx="0">
+              <a:schemeClr val="dk1"/>
+            </a:effectRef>
+            <a:fontRef idx="minor">
+              <a:schemeClr val="dk1"/>
+            </a:fontRef>
+          </p:style>
+          <p:txBody>
+            <a:bodyPr tIns="0" rtlCol="0" anchor="t" anchorCtr="0"/>
+            <a:lstStyle/>
+            <a:p>
+              <a:pPr algn="ctr"/>
+              <a:r>
+                <a:rPr lang="en-US" sz="1400" dirty="0" smtClean="0">
+                  <a:cs typeface="Calibri Light"/>
+                </a:rPr>
+                <a:t>Customer</a:t>
+              </a:r>
+            </a:p>
+          </p:txBody>
+        </p:sp>
+        <p:sp>
+          <p:nvSpPr>
+            <p:cNvPr id="580" name="Rounded Rectangle 579"/>
+            <p:cNvSpPr/>
+            <p:nvPr/>
+          </p:nvSpPr>
+          <p:spPr>
+            <a:xfrm>
+              <a:off x="514804" y="1615846"/>
+              <a:ext cx="801652" cy="236223"/>
+            </a:xfrm>
+            <a:prstGeom prst="roundRect">
+              <a:avLst/>
+            </a:prstGeom>
+            <a:solidFill>
+              <a:srgbClr val="005586"/>
+            </a:solidFill>
+            <a:ln>
+              <a:solidFill>
+                <a:srgbClr val="005586"/>
+              </a:solidFill>
+            </a:ln>
+          </p:spPr>
+          <p:style>
+            <a:lnRef idx="2">
+              <a:schemeClr val="dk1">
+                <a:shade val="50000"/>
+              </a:schemeClr>
+            </a:lnRef>
+            <a:fillRef idx="1">
+              <a:schemeClr val="dk1"/>
+            </a:fillRef>
+            <a:effectRef idx="0">
+              <a:schemeClr val="dk1"/>
+            </a:effectRef>
+            <a:fontRef idx="minor">
+              <a:schemeClr val="lt1"/>
+            </a:fontRef>
+          </p:style>
+          <p:txBody>
+            <a:bodyPr rtlCol="0" anchor="ctr"/>
+            <a:lstStyle/>
+            <a:p>
+              <a:pPr algn="ctr"/>
+              <a:r>
+                <a:rPr lang="en-US" sz="1000" dirty="0" smtClean="0">
+                  <a:cs typeface="Calibri Light"/>
+                </a:rPr>
+                <a:t>Sys Admin</a:t>
+              </a:r>
+              <a:endParaRPr lang="en-US" sz="1000" dirty="0">
+                <a:solidFill>
+                  <a:srgbClr val="29A7DE"/>
+                </a:solidFill>
+                <a:cs typeface="Calibri Light"/>
+              </a:endParaRPr>
+            </a:p>
+          </p:txBody>
+        </p:sp>
+        <p:sp>
+          <p:nvSpPr>
+            <p:cNvPr id="581" name="Rounded Rectangle 580"/>
+            <p:cNvSpPr/>
+            <p:nvPr/>
+          </p:nvSpPr>
+          <p:spPr>
+            <a:xfrm>
+              <a:off x="514804" y="1923835"/>
+              <a:ext cx="801652" cy="236223"/>
+            </a:xfrm>
+            <a:prstGeom prst="roundRect">
+              <a:avLst/>
+            </a:prstGeom>
+            <a:solidFill>
+              <a:srgbClr val="005586"/>
+            </a:solidFill>
+            <a:ln>
+              <a:solidFill>
+                <a:srgbClr val="005586"/>
+              </a:solidFill>
+            </a:ln>
+          </p:spPr>
+          <p:style>
+            <a:lnRef idx="2">
+              <a:schemeClr val="dk1">
+                <a:shade val="50000"/>
+              </a:schemeClr>
+            </a:lnRef>
+            <a:fillRef idx="1">
+              <a:schemeClr val="dk1"/>
+            </a:fillRef>
+            <a:effectRef idx="0">
+              <a:schemeClr val="dk1"/>
+            </a:effectRef>
+            <a:fontRef idx="minor">
+              <a:schemeClr val="lt1"/>
+            </a:fontRef>
+          </p:style>
+          <p:txBody>
+            <a:bodyPr rtlCol="0" anchor="ctr"/>
+            <a:lstStyle/>
+            <a:p>
+              <a:pPr algn="ctr"/>
+              <a:r>
+                <a:rPr lang="en-US" sz="1000" dirty="0" smtClean="0">
+                  <a:cs typeface="Calibri Light"/>
+                </a:rPr>
+                <a:t>Dev Ops</a:t>
+              </a:r>
+              <a:endParaRPr lang="en-US" sz="1000" dirty="0">
+                <a:solidFill>
+                  <a:srgbClr val="29A7DE"/>
+                </a:solidFill>
+                <a:cs typeface="Calibri Light"/>
+              </a:endParaRPr>
+            </a:p>
+          </p:txBody>
+        </p:sp>
+      </p:grpSp>
+      <p:grpSp>
+        <p:nvGrpSpPr>
+          <p:cNvPr id="582" name="Group 581"/>
+          <p:cNvGrpSpPr/>
+          <p:nvPr/>
+        </p:nvGrpSpPr>
+        <p:grpSpPr>
+          <a:xfrm>
+            <a:off x="5431902" y="2807062"/>
+            <a:ext cx="1019700" cy="666000"/>
+            <a:chOff x="8464884" y="2698114"/>
+            <a:chExt cx="1019700" cy="666000"/>
+          </a:xfrm>
+        </p:grpSpPr>
+        <p:sp>
+          <p:nvSpPr>
+            <p:cNvPr id="583" name="Rounded Rectangle 582"/>
+            <p:cNvSpPr/>
+            <p:nvPr/>
+          </p:nvSpPr>
+          <p:spPr>
+            <a:xfrm>
+              <a:off x="8464884" y="2698114"/>
+              <a:ext cx="1019700" cy="666000"/>
+            </a:xfrm>
+            <a:prstGeom prst="roundRect">
+              <a:avLst>
+                <a:gd name="adj" fmla="val 8610"/>
+              </a:avLst>
+            </a:prstGeom>
+            <a:solidFill>
+              <a:schemeClr val="bg1">
+                <a:lumMod val="85000"/>
+              </a:schemeClr>
+            </a:solidFill>
+            <a:ln w="38100" cmpd="sng">
+              <a:noFill/>
+            </a:ln>
+          </p:spPr>
+          <p:style>
+            <a:lnRef idx="2">
+              <a:schemeClr val="dk1"/>
+            </a:lnRef>
+            <a:fillRef idx="1">
+              <a:schemeClr val="lt1"/>
+            </a:fillRef>
+            <a:effectRef idx="0">
+              <a:schemeClr val="dk1"/>
+            </a:effectRef>
+            <a:fontRef idx="minor">
+              <a:schemeClr val="dk1"/>
+            </a:fontRef>
+          </p:style>
+          <p:txBody>
+            <a:bodyPr tIns="0" rtlCol="0" anchor="t" anchorCtr="0"/>
+            <a:lstStyle/>
+            <a:p>
+              <a:pPr algn="ctr"/>
+              <a:r>
+                <a:rPr lang="en-US" sz="1400" dirty="0" smtClean="0">
+                  <a:cs typeface="Calibri Light"/>
+                </a:rPr>
+                <a:t>Customer</a:t>
+              </a:r>
+              <a:endParaRPr lang="en-US" sz="1600" dirty="0" smtClean="0">
+                <a:cs typeface="Calibri Light"/>
+              </a:endParaRPr>
+            </a:p>
+          </p:txBody>
+        </p:sp>
+        <p:sp>
+          <p:nvSpPr>
+            <p:cNvPr id="584" name="Rounded Rectangle 583"/>
+            <p:cNvSpPr/>
+            <p:nvPr/>
+          </p:nvSpPr>
+          <p:spPr>
+            <a:xfrm>
+              <a:off x="8571932" y="3007869"/>
+              <a:ext cx="801653" cy="236223"/>
+            </a:xfrm>
+            <a:prstGeom prst="roundRect">
+              <a:avLst/>
+            </a:prstGeom>
+            <a:solidFill>
+              <a:schemeClr val="tx1"/>
+            </a:solidFill>
+            <a:ln>
+              <a:solidFill>
+                <a:schemeClr val="tx1"/>
+              </a:solidFill>
+            </a:ln>
+          </p:spPr>
+          <p:style>
+            <a:lnRef idx="2">
+              <a:schemeClr val="dk1">
+                <a:shade val="50000"/>
+              </a:schemeClr>
+            </a:lnRef>
+            <a:fillRef idx="1">
+              <a:schemeClr val="dk1"/>
+            </a:fillRef>
+            <a:effectRef idx="0">
+              <a:schemeClr val="dk1"/>
+            </a:effectRef>
+            <a:fontRef idx="minor">
+              <a:schemeClr val="lt1"/>
+            </a:fontRef>
+          </p:style>
+          <p:txBody>
+            <a:bodyPr rtlCol="0" anchor="ctr"/>
+            <a:lstStyle/>
+            <a:p>
+              <a:pPr algn="ctr"/>
+              <a:r>
+                <a:rPr lang="en-US" sz="1000" dirty="0" smtClean="0">
+                  <a:cs typeface="Calibri Light"/>
+                </a:rPr>
+                <a:t>Steward</a:t>
+              </a:r>
+              <a:endParaRPr lang="en-US" sz="1000" dirty="0">
+                <a:solidFill>
+                  <a:srgbClr val="29A7DE"/>
+                </a:solidFill>
+                <a:cs typeface="Calibri Light"/>
+              </a:endParaRPr>
+            </a:p>
+          </p:txBody>
+        </p:sp>
+      </p:grpSp>
+      <p:grpSp>
+        <p:nvGrpSpPr>
+          <p:cNvPr id="585" name="Group 584"/>
+          <p:cNvGrpSpPr/>
+          <p:nvPr/>
+        </p:nvGrpSpPr>
+        <p:grpSpPr>
+          <a:xfrm>
+            <a:off x="6621459" y="2504202"/>
+            <a:ext cx="1019700" cy="968860"/>
+            <a:chOff x="405780" y="1290494"/>
+            <a:chExt cx="1019700" cy="968860"/>
+          </a:xfrm>
+        </p:grpSpPr>
+        <p:sp>
+          <p:nvSpPr>
+            <p:cNvPr id="586" name="Rounded Rectangle 585"/>
+            <p:cNvSpPr/>
+            <p:nvPr/>
+          </p:nvSpPr>
+          <p:spPr>
+            <a:xfrm>
+              <a:off x="405780" y="1290494"/>
+              <a:ext cx="1019700" cy="968860"/>
+            </a:xfrm>
+            <a:prstGeom prst="roundRect">
+              <a:avLst>
+                <a:gd name="adj" fmla="val 8610"/>
+              </a:avLst>
+            </a:prstGeom>
+            <a:solidFill>
+              <a:schemeClr val="bg1">
+                <a:lumMod val="85000"/>
+              </a:schemeClr>
+            </a:solidFill>
+            <a:ln w="38100" cmpd="sng">
+              <a:noFill/>
+            </a:ln>
+          </p:spPr>
+          <p:style>
+            <a:lnRef idx="2">
+              <a:schemeClr val="dk1"/>
+            </a:lnRef>
+            <a:fillRef idx="1">
+              <a:schemeClr val="lt1"/>
+            </a:fillRef>
+            <a:effectRef idx="0">
+              <a:schemeClr val="dk1"/>
+            </a:effectRef>
+            <a:fontRef idx="minor">
+              <a:schemeClr val="dk1"/>
+            </a:fontRef>
+          </p:style>
+          <p:txBody>
+            <a:bodyPr tIns="0" rtlCol="0" anchor="t" anchorCtr="0"/>
+            <a:lstStyle/>
+            <a:p>
+              <a:pPr algn="ctr"/>
+              <a:r>
+                <a:rPr lang="en-US" sz="1400" dirty="0" smtClean="0">
+                  <a:cs typeface="Calibri Light"/>
+                </a:rPr>
+                <a:t>Customer</a:t>
+              </a:r>
+            </a:p>
+          </p:txBody>
+        </p:sp>
+        <p:sp>
+          <p:nvSpPr>
+            <p:cNvPr id="587" name="Rounded Rectangle 586"/>
+            <p:cNvSpPr/>
+            <p:nvPr/>
+          </p:nvSpPr>
+          <p:spPr>
+            <a:xfrm>
+              <a:off x="514804" y="1615846"/>
+              <a:ext cx="801652" cy="236223"/>
+            </a:xfrm>
+            <a:prstGeom prst="roundRect">
+              <a:avLst/>
+            </a:prstGeom>
+            <a:solidFill>
+              <a:srgbClr val="005586"/>
+            </a:solidFill>
+            <a:ln>
+              <a:solidFill>
+                <a:srgbClr val="005586"/>
+              </a:solidFill>
+            </a:ln>
+          </p:spPr>
+          <p:style>
+            <a:lnRef idx="2">
+              <a:schemeClr val="dk1">
+                <a:shade val="50000"/>
+              </a:schemeClr>
+            </a:lnRef>
+            <a:fillRef idx="1">
+              <a:schemeClr val="dk1"/>
+            </a:fillRef>
+            <a:effectRef idx="0">
+              <a:schemeClr val="dk1"/>
+            </a:effectRef>
+            <a:fontRef idx="minor">
+              <a:schemeClr val="lt1"/>
+            </a:fontRef>
+          </p:style>
+          <p:txBody>
+            <a:bodyPr rtlCol="0" anchor="ctr"/>
+            <a:lstStyle/>
+            <a:p>
+              <a:pPr algn="ctr"/>
+              <a:r>
+                <a:rPr lang="en-US" sz="1000" dirty="0" smtClean="0">
+                  <a:cs typeface="Calibri Light"/>
+                </a:rPr>
+                <a:t>Engineer</a:t>
+              </a:r>
+              <a:endParaRPr lang="en-US" sz="1000" dirty="0">
+                <a:solidFill>
+                  <a:srgbClr val="29A7DE"/>
+                </a:solidFill>
+                <a:cs typeface="Calibri Light"/>
+              </a:endParaRPr>
+            </a:p>
+          </p:txBody>
+        </p:sp>
+        <p:sp>
+          <p:nvSpPr>
+            <p:cNvPr id="588" name="Rounded Rectangle 587"/>
+            <p:cNvSpPr/>
+            <p:nvPr/>
+          </p:nvSpPr>
+          <p:spPr>
+            <a:xfrm>
+              <a:off x="514804" y="1923835"/>
+              <a:ext cx="801652" cy="236223"/>
+            </a:xfrm>
+            <a:prstGeom prst="roundRect">
+              <a:avLst/>
+            </a:prstGeom>
+            <a:solidFill>
+              <a:srgbClr val="005586"/>
+            </a:solidFill>
+            <a:ln>
+              <a:solidFill>
+                <a:srgbClr val="005586"/>
+              </a:solidFill>
+            </a:ln>
+          </p:spPr>
+          <p:style>
+            <a:lnRef idx="2">
+              <a:schemeClr val="dk1">
+                <a:shade val="50000"/>
+              </a:schemeClr>
+            </a:lnRef>
+            <a:fillRef idx="1">
+              <a:schemeClr val="dk1"/>
+            </a:fillRef>
+            <a:effectRef idx="0">
+              <a:schemeClr val="dk1"/>
+            </a:effectRef>
+            <a:fontRef idx="minor">
+              <a:schemeClr val="lt1"/>
+            </a:fontRef>
+          </p:style>
+          <p:txBody>
+            <a:bodyPr rtlCol="0" anchor="ctr"/>
+            <a:lstStyle/>
+            <a:p>
+              <a:pPr algn="ctr"/>
+              <a:r>
+                <a:rPr lang="en-US" sz="1000" dirty="0" smtClean="0">
+                  <a:cs typeface="Calibri Light"/>
+                </a:rPr>
+                <a:t>ETL Dev</a:t>
+              </a:r>
+              <a:endParaRPr lang="en-US" sz="1000" dirty="0">
+                <a:solidFill>
+                  <a:srgbClr val="29A7DE"/>
+                </a:solidFill>
+                <a:cs typeface="Calibri Light"/>
+              </a:endParaRPr>
+            </a:p>
+          </p:txBody>
+        </p:sp>
+      </p:grpSp>
+      <p:grpSp>
+        <p:nvGrpSpPr>
+          <p:cNvPr id="589" name="Group 588"/>
+          <p:cNvGrpSpPr/>
+          <p:nvPr/>
+        </p:nvGrpSpPr>
+        <p:grpSpPr>
+          <a:xfrm>
+            <a:off x="7822604" y="2504202"/>
+            <a:ext cx="1019700" cy="968860"/>
+            <a:chOff x="405780" y="1290494"/>
+            <a:chExt cx="1019700" cy="968860"/>
+          </a:xfrm>
+        </p:grpSpPr>
+        <p:sp>
+          <p:nvSpPr>
+            <p:cNvPr id="590" name="Rounded Rectangle 589"/>
+            <p:cNvSpPr/>
+            <p:nvPr/>
+          </p:nvSpPr>
+          <p:spPr>
+            <a:xfrm>
+              <a:off x="405780" y="1290494"/>
+              <a:ext cx="1019700" cy="968860"/>
+            </a:xfrm>
+            <a:prstGeom prst="roundRect">
+              <a:avLst>
+                <a:gd name="adj" fmla="val 8610"/>
+              </a:avLst>
+            </a:prstGeom>
+            <a:solidFill>
+              <a:schemeClr val="bg1">
+                <a:lumMod val="85000"/>
+              </a:schemeClr>
+            </a:solidFill>
+            <a:ln w="38100" cmpd="sng">
+              <a:noFill/>
+            </a:ln>
+          </p:spPr>
+          <p:style>
+            <a:lnRef idx="2">
+              <a:schemeClr val="dk1"/>
+            </a:lnRef>
+            <a:fillRef idx="1">
+              <a:schemeClr val="lt1"/>
+            </a:fillRef>
+            <a:effectRef idx="0">
+              <a:schemeClr val="dk1"/>
+            </a:effectRef>
+            <a:fontRef idx="minor">
+              <a:schemeClr val="dk1"/>
+            </a:fontRef>
+          </p:style>
+          <p:txBody>
+            <a:bodyPr tIns="0" rtlCol="0" anchor="t" anchorCtr="0"/>
+            <a:lstStyle/>
+            <a:p>
+              <a:pPr algn="ctr"/>
+              <a:r>
+                <a:rPr lang="en-US" sz="1400" dirty="0" smtClean="0">
+                  <a:cs typeface="Calibri Light"/>
+                </a:rPr>
+                <a:t>Customer</a:t>
+              </a:r>
+            </a:p>
+          </p:txBody>
+        </p:sp>
+        <p:sp>
+          <p:nvSpPr>
+            <p:cNvPr id="591" name="Rounded Rectangle 590"/>
+            <p:cNvSpPr/>
+            <p:nvPr/>
+          </p:nvSpPr>
+          <p:spPr>
+            <a:xfrm>
+              <a:off x="514804" y="1615846"/>
+              <a:ext cx="801652" cy="236223"/>
+            </a:xfrm>
+            <a:prstGeom prst="roundRect">
+              <a:avLst/>
+            </a:prstGeom>
+            <a:solidFill>
+              <a:srgbClr val="005586"/>
+            </a:solidFill>
+            <a:ln>
+              <a:solidFill>
+                <a:srgbClr val="005586"/>
+              </a:solidFill>
+            </a:ln>
+          </p:spPr>
+          <p:style>
+            <a:lnRef idx="2">
+              <a:schemeClr val="dk1">
+                <a:shade val="50000"/>
+              </a:schemeClr>
+            </a:lnRef>
+            <a:fillRef idx="1">
+              <a:schemeClr val="dk1"/>
+            </a:fillRef>
+            <a:effectRef idx="0">
+              <a:schemeClr val="dk1"/>
+            </a:effectRef>
+            <a:fontRef idx="minor">
+              <a:schemeClr val="lt1"/>
+            </a:fontRef>
+          </p:style>
+          <p:txBody>
+            <a:bodyPr rtlCol="0" anchor="ctr"/>
+            <a:lstStyle/>
+            <a:p>
+              <a:pPr algn="ctr"/>
+              <a:r>
+                <a:rPr lang="en-US" sz="1000" dirty="0" smtClean="0">
+                  <a:cs typeface="Calibri Light"/>
+                </a:rPr>
+                <a:t>Analyst</a:t>
+              </a:r>
+              <a:endParaRPr lang="en-US" sz="1000" dirty="0">
+                <a:solidFill>
+                  <a:srgbClr val="29A7DE"/>
+                </a:solidFill>
+                <a:cs typeface="Calibri Light"/>
+              </a:endParaRPr>
+            </a:p>
+          </p:txBody>
+        </p:sp>
+        <p:sp>
+          <p:nvSpPr>
+            <p:cNvPr id="592" name="Rounded Rectangle 591"/>
+            <p:cNvSpPr/>
+            <p:nvPr/>
+          </p:nvSpPr>
+          <p:spPr>
+            <a:xfrm>
+              <a:off x="514804" y="1923835"/>
+              <a:ext cx="801652" cy="236223"/>
+            </a:xfrm>
+            <a:prstGeom prst="roundRect">
+              <a:avLst/>
+            </a:prstGeom>
+            <a:solidFill>
+              <a:srgbClr val="005586"/>
+            </a:solidFill>
+            <a:ln>
+              <a:solidFill>
+                <a:srgbClr val="005586"/>
+              </a:solidFill>
+            </a:ln>
+          </p:spPr>
+          <p:style>
+            <a:lnRef idx="2">
+              <a:schemeClr val="dk1">
+                <a:shade val="50000"/>
+              </a:schemeClr>
+            </a:lnRef>
+            <a:fillRef idx="1">
+              <a:schemeClr val="dk1"/>
+            </a:fillRef>
+            <a:effectRef idx="0">
+              <a:schemeClr val="dk1"/>
+            </a:effectRef>
+            <a:fontRef idx="minor">
+              <a:schemeClr val="lt1"/>
+            </a:fontRef>
+          </p:style>
+          <p:txBody>
+            <a:bodyPr rtlCol="0" anchor="ctr"/>
+            <a:lstStyle/>
+            <a:p>
+              <a:pPr algn="ctr"/>
+              <a:r>
+                <a:rPr lang="en-US" sz="1000" dirty="0" smtClean="0">
+                  <a:cs typeface="Calibri Light"/>
+                </a:rPr>
+                <a:t>Scientist</a:t>
+              </a:r>
+              <a:endParaRPr lang="en-US" sz="1000" dirty="0">
+                <a:solidFill>
+                  <a:srgbClr val="29A7DE"/>
+                </a:solidFill>
+                <a:cs typeface="Calibri Light"/>
+              </a:endParaRPr>
+            </a:p>
+          </p:txBody>
+        </p:sp>
+      </p:grpSp>
+      <p:grpSp>
+        <p:nvGrpSpPr>
+          <p:cNvPr id="593" name="Group 592"/>
+          <p:cNvGrpSpPr/>
+          <p:nvPr/>
+        </p:nvGrpSpPr>
+        <p:grpSpPr>
+          <a:xfrm>
+            <a:off x="4222204" y="1315341"/>
+            <a:ext cx="1019700" cy="968860"/>
+            <a:chOff x="405780" y="1290494"/>
+            <a:chExt cx="1019700" cy="968860"/>
+          </a:xfrm>
+        </p:grpSpPr>
+        <p:sp>
+          <p:nvSpPr>
+            <p:cNvPr id="594" name="Rounded Rectangle 593"/>
+            <p:cNvSpPr/>
+            <p:nvPr/>
+          </p:nvSpPr>
+          <p:spPr>
+            <a:xfrm>
+              <a:off x="405780" y="1290494"/>
+              <a:ext cx="1019700" cy="968860"/>
+            </a:xfrm>
+            <a:prstGeom prst="roundRect">
+              <a:avLst>
+                <a:gd name="adj" fmla="val 8610"/>
+              </a:avLst>
+            </a:prstGeom>
+            <a:solidFill>
+              <a:schemeClr val="bg1">
+                <a:lumMod val="85000"/>
+              </a:schemeClr>
+            </a:solidFill>
+            <a:ln w="38100" cmpd="sng">
+              <a:noFill/>
+            </a:ln>
+          </p:spPr>
+          <p:style>
+            <a:lnRef idx="2">
+              <a:schemeClr val="dk1"/>
+            </a:lnRef>
+            <a:fillRef idx="1">
+              <a:schemeClr val="lt1"/>
+            </a:fillRef>
+            <a:effectRef idx="0">
+              <a:schemeClr val="dk1"/>
+            </a:effectRef>
+            <a:fontRef idx="minor">
+              <a:schemeClr val="dk1"/>
+            </a:fontRef>
+          </p:style>
+          <p:txBody>
+            <a:bodyPr tIns="0" rtlCol="0" anchor="t" anchorCtr="0"/>
+            <a:lstStyle/>
+            <a:p>
+              <a:pPr algn="ctr"/>
+              <a:r>
+                <a:rPr lang="en-US" sz="1400" dirty="0" smtClean="0">
+                  <a:cs typeface="Calibri Light"/>
+                </a:rPr>
+                <a:t>Customer</a:t>
+              </a:r>
+            </a:p>
+          </p:txBody>
+        </p:sp>
+        <p:sp>
+          <p:nvSpPr>
+            <p:cNvPr id="595" name="Rounded Rectangle 594"/>
+            <p:cNvSpPr/>
+            <p:nvPr/>
+          </p:nvSpPr>
+          <p:spPr>
+            <a:xfrm>
+              <a:off x="514804" y="1615846"/>
+              <a:ext cx="801652" cy="236223"/>
+            </a:xfrm>
+            <a:prstGeom prst="roundRect">
+              <a:avLst/>
+            </a:prstGeom>
+            <a:solidFill>
+              <a:schemeClr val="tx1"/>
+            </a:solidFill>
+            <a:ln>
+              <a:solidFill>
+                <a:schemeClr val="tx1"/>
+              </a:solidFill>
+            </a:ln>
+          </p:spPr>
+          <p:style>
+            <a:lnRef idx="2">
+              <a:schemeClr val="dk1">
+                <a:shade val="50000"/>
+              </a:schemeClr>
+            </a:lnRef>
+            <a:fillRef idx="1">
+              <a:schemeClr val="dk1"/>
+            </a:fillRef>
+            <a:effectRef idx="0">
+              <a:schemeClr val="dk1"/>
+            </a:effectRef>
+            <a:fontRef idx="minor">
+              <a:schemeClr val="lt1"/>
+            </a:fontRef>
+          </p:style>
+          <p:txBody>
+            <a:bodyPr rtlCol="0" anchor="ctr"/>
+            <a:lstStyle/>
+            <a:p>
+              <a:pPr algn="ctr"/>
+              <a:r>
+                <a:rPr lang="en-US" sz="1000" dirty="0" smtClean="0">
+                  <a:cs typeface="Calibri Light"/>
+                </a:rPr>
+                <a:t>CIO</a:t>
+              </a:r>
+              <a:endParaRPr lang="en-US" sz="1000" dirty="0">
+                <a:solidFill>
+                  <a:srgbClr val="29A7DE"/>
+                </a:solidFill>
+                <a:cs typeface="Calibri Light"/>
+              </a:endParaRPr>
+            </a:p>
+          </p:txBody>
+        </p:sp>
+        <p:sp>
+          <p:nvSpPr>
+            <p:cNvPr id="596" name="Rounded Rectangle 595"/>
+            <p:cNvSpPr/>
+            <p:nvPr/>
+          </p:nvSpPr>
+          <p:spPr>
+            <a:xfrm>
+              <a:off x="514804" y="1923835"/>
+              <a:ext cx="801652" cy="236223"/>
+            </a:xfrm>
+            <a:prstGeom prst="roundRect">
+              <a:avLst/>
+            </a:prstGeom>
+            <a:solidFill>
+              <a:schemeClr val="tx1"/>
+            </a:solidFill>
+            <a:ln>
+              <a:solidFill>
+                <a:schemeClr val="tx1"/>
+              </a:solidFill>
+            </a:ln>
+          </p:spPr>
+          <p:style>
+            <a:lnRef idx="2">
+              <a:schemeClr val="dk1">
+                <a:shade val="50000"/>
+              </a:schemeClr>
+            </a:lnRef>
+            <a:fillRef idx="1">
+              <a:schemeClr val="dk1"/>
+            </a:fillRef>
+            <a:effectRef idx="0">
+              <a:schemeClr val="dk1"/>
+            </a:effectRef>
+            <a:fontRef idx="minor">
+              <a:schemeClr val="lt1"/>
+            </a:fontRef>
+          </p:style>
+          <p:txBody>
+            <a:bodyPr rtlCol="0" anchor="ctr"/>
+            <a:lstStyle/>
+            <a:p>
+              <a:pPr algn="ctr"/>
+              <a:r>
+                <a:rPr lang="en-US" sz="1000" dirty="0" smtClean="0">
+                  <a:cs typeface="Calibri Light"/>
+                </a:rPr>
+                <a:t>Business</a:t>
+              </a:r>
+              <a:endParaRPr lang="en-US" sz="1000" dirty="0">
+                <a:solidFill>
+                  <a:srgbClr val="29A7DE"/>
+                </a:solidFill>
+                <a:cs typeface="Calibri Light"/>
+              </a:endParaRPr>
+            </a:p>
+          </p:txBody>
+        </p:sp>
+      </p:grpSp>
+      <p:grpSp>
+        <p:nvGrpSpPr>
+          <p:cNvPr id="597" name="Group 596"/>
+          <p:cNvGrpSpPr/>
+          <p:nvPr/>
+        </p:nvGrpSpPr>
+        <p:grpSpPr>
+          <a:xfrm>
+            <a:off x="6621459" y="1315341"/>
+            <a:ext cx="1019700" cy="968860"/>
+            <a:chOff x="405780" y="1290494"/>
+            <a:chExt cx="1019700" cy="968860"/>
+          </a:xfrm>
+        </p:grpSpPr>
+        <p:sp>
+          <p:nvSpPr>
+            <p:cNvPr id="598" name="Rounded Rectangle 597"/>
+            <p:cNvSpPr/>
+            <p:nvPr/>
+          </p:nvSpPr>
+          <p:spPr>
+            <a:xfrm>
+              <a:off x="405780" y="1290494"/>
+              <a:ext cx="1019700" cy="968860"/>
+            </a:xfrm>
+            <a:prstGeom prst="roundRect">
+              <a:avLst>
+                <a:gd name="adj" fmla="val 8610"/>
+              </a:avLst>
+            </a:prstGeom>
+            <a:solidFill>
+              <a:schemeClr val="bg1">
+                <a:lumMod val="85000"/>
+              </a:schemeClr>
+            </a:solidFill>
+            <a:ln w="38100" cmpd="sng">
+              <a:noFill/>
+            </a:ln>
+          </p:spPr>
+          <p:style>
+            <a:lnRef idx="2">
+              <a:schemeClr val="dk1"/>
+            </a:lnRef>
+            <a:fillRef idx="1">
+              <a:schemeClr val="lt1"/>
+            </a:fillRef>
+            <a:effectRef idx="0">
+              <a:schemeClr val="dk1"/>
+            </a:effectRef>
+            <a:fontRef idx="minor">
+              <a:schemeClr val="dk1"/>
+            </a:fontRef>
+          </p:style>
+          <p:txBody>
+            <a:bodyPr tIns="0" rtlCol="0" anchor="t" anchorCtr="0"/>
+            <a:lstStyle/>
+            <a:p>
+              <a:pPr algn="ctr"/>
+              <a:r>
+                <a:rPr lang="en-US" sz="1400" dirty="0" smtClean="0">
+                  <a:cs typeface="Calibri Light"/>
+                </a:rPr>
+                <a:t>Customer</a:t>
+              </a:r>
+            </a:p>
+          </p:txBody>
+        </p:sp>
+        <p:sp>
+          <p:nvSpPr>
+            <p:cNvPr id="599" name="Rounded Rectangle 598"/>
+            <p:cNvSpPr/>
+            <p:nvPr/>
+          </p:nvSpPr>
+          <p:spPr>
+            <a:xfrm>
+              <a:off x="514804" y="1615846"/>
+              <a:ext cx="801652" cy="236223"/>
+            </a:xfrm>
+            <a:prstGeom prst="roundRect">
+              <a:avLst/>
+            </a:prstGeom>
+            <a:solidFill>
+              <a:srgbClr val="005586"/>
+            </a:solidFill>
+            <a:ln>
+              <a:solidFill>
+                <a:srgbClr val="005586"/>
+              </a:solidFill>
+            </a:ln>
+          </p:spPr>
+          <p:style>
+            <a:lnRef idx="2">
+              <a:schemeClr val="dk1">
+                <a:shade val="50000"/>
+              </a:schemeClr>
+            </a:lnRef>
+            <a:fillRef idx="1">
+              <a:schemeClr val="dk1"/>
+            </a:fillRef>
+            <a:effectRef idx="0">
+              <a:schemeClr val="dk1"/>
+            </a:effectRef>
+            <a:fontRef idx="minor">
+              <a:schemeClr val="lt1"/>
+            </a:fontRef>
+          </p:style>
+          <p:txBody>
+            <a:bodyPr rtlCol="0" anchor="ctr"/>
+            <a:lstStyle/>
+            <a:p>
+              <a:pPr algn="ctr"/>
+              <a:r>
+                <a:rPr lang="en-US" sz="1000" dirty="0" smtClean="0">
+                  <a:cs typeface="Calibri Light"/>
+                </a:rPr>
+                <a:t>CTO</a:t>
+              </a:r>
+              <a:endParaRPr lang="en-US" sz="1000" dirty="0">
+                <a:solidFill>
+                  <a:srgbClr val="29A7DE"/>
+                </a:solidFill>
+                <a:cs typeface="Calibri Light"/>
+              </a:endParaRPr>
+            </a:p>
+          </p:txBody>
+        </p:sp>
+        <p:sp>
+          <p:nvSpPr>
+            <p:cNvPr id="600" name="Rounded Rectangle 599"/>
+            <p:cNvSpPr/>
+            <p:nvPr/>
+          </p:nvSpPr>
+          <p:spPr>
+            <a:xfrm>
+              <a:off x="514804" y="1923835"/>
+              <a:ext cx="801652" cy="236223"/>
+            </a:xfrm>
+            <a:prstGeom prst="roundRect">
+              <a:avLst/>
+            </a:prstGeom>
+            <a:solidFill>
+              <a:srgbClr val="005586"/>
+            </a:solidFill>
+            <a:ln>
+              <a:solidFill>
+                <a:srgbClr val="005586"/>
+              </a:solidFill>
+            </a:ln>
+          </p:spPr>
+          <p:style>
+            <a:lnRef idx="2">
+              <a:schemeClr val="dk1">
+                <a:shade val="50000"/>
+              </a:schemeClr>
+            </a:lnRef>
+            <a:fillRef idx="1">
+              <a:schemeClr val="dk1"/>
+            </a:fillRef>
+            <a:effectRef idx="0">
+              <a:schemeClr val="dk1"/>
+            </a:effectRef>
+            <a:fontRef idx="minor">
+              <a:schemeClr val="lt1"/>
+            </a:fontRef>
+          </p:style>
+          <p:txBody>
+            <a:bodyPr rtlCol="0" anchor="ctr"/>
+            <a:lstStyle/>
+            <a:p>
+              <a:pPr algn="ctr"/>
+              <a:r>
+                <a:rPr lang="en-US" sz="1000" dirty="0" smtClean="0">
+                  <a:cs typeface="Calibri Light"/>
+                </a:rPr>
+                <a:t>Architect</a:t>
+              </a:r>
+              <a:endParaRPr lang="en-US" sz="1000" dirty="0">
+                <a:solidFill>
+                  <a:srgbClr val="29A7DE"/>
+                </a:solidFill>
+                <a:cs typeface="Calibri Light"/>
+              </a:endParaRPr>
+            </a:p>
+          </p:txBody>
+        </p:sp>
+      </p:grpSp>
+      <p:cxnSp>
+        <p:nvCxnSpPr>
+          <p:cNvPr id="601" name="Straight Arrow Connector 218"/>
+          <p:cNvCxnSpPr>
+            <a:endCxn id="576" idx="3"/>
+          </p:cNvCxnSpPr>
+          <p:nvPr/>
+        </p:nvCxnSpPr>
+        <p:spPr>
+          <a:xfrm flipH="1">
+            <a:off x="4017768" y="3142580"/>
+            <a:ext cx="211701" cy="1"/>
+          </a:xfrm>
+          <a:prstGeom prst="straightConnector1">
+            <a:avLst/>
+          </a:prstGeom>
+          <a:ln w="12700">
+            <a:solidFill>
+              <a:schemeClr val="tx1"/>
+            </a:solidFill>
+            <a:headEnd type="triangle"/>
+            <a:tailEnd type="triangle"/>
+          </a:ln>
+          <a:effectLst/>
+        </p:spPr>
+        <p:style>
+          <a:lnRef idx="2">
+            <a:schemeClr val="accent1"/>
+          </a:lnRef>
+          <a:fillRef idx="0">
+            <a:schemeClr val="accent1"/>
+          </a:fillRef>
+          <a:effectRef idx="1">
+            <a:schemeClr val="accent1"/>
+          </a:effectRef>
+          <a:fontRef idx="minor">
+            <a:schemeClr val="tx1"/>
+          </a:fontRef>
+        </p:style>
+      </p:cxnSp>
+      <p:cxnSp>
+        <p:nvCxnSpPr>
+          <p:cNvPr id="602" name="Straight Arrow Connector 218"/>
+          <p:cNvCxnSpPr>
+            <a:stCxn id="598" idx="1"/>
+            <a:endCxn id="583" idx="0"/>
+          </p:cNvCxnSpPr>
+          <p:nvPr/>
+        </p:nvCxnSpPr>
+        <p:spPr>
+          <a:xfrm rot="10800000" flipV="1">
+            <a:off x="5941753" y="1799770"/>
+            <a:ext cx="679707" cy="1007291"/>
+          </a:xfrm>
+          <a:prstGeom prst="bentConnector2">
+            <a:avLst/>
+          </a:prstGeom>
+          <a:ln w="12700">
+            <a:solidFill>
+              <a:schemeClr val="tx1"/>
+            </a:solidFill>
+            <a:tailEnd type="triangle"/>
+          </a:ln>
+          <a:effectLst/>
+        </p:spPr>
+        <p:style>
+          <a:lnRef idx="2">
+            <a:schemeClr val="accent1"/>
+          </a:lnRef>
+          <a:fillRef idx="0">
+            <a:schemeClr val="accent1"/>
+          </a:fillRef>
+          <a:effectRef idx="1">
+            <a:schemeClr val="accent1"/>
+          </a:effectRef>
+          <a:fontRef idx="minor">
+            <a:schemeClr val="tx1"/>
+          </a:fontRef>
+        </p:style>
+      </p:cxnSp>
+      <p:cxnSp>
+        <p:nvCxnSpPr>
+          <p:cNvPr id="603" name="Straight Arrow Connector 218"/>
+          <p:cNvCxnSpPr>
+            <a:stCxn id="594" idx="0"/>
+            <a:endCxn id="590" idx="0"/>
+          </p:cNvCxnSpPr>
+          <p:nvPr/>
+        </p:nvCxnSpPr>
+        <p:spPr>
+          <a:xfrm rot="16200000" flipH="1">
+            <a:off x="5937823" y="109571"/>
+            <a:ext cx="1188861" cy="3600400"/>
+          </a:xfrm>
+          <a:prstGeom prst="bentConnector3">
+            <a:avLst>
+              <a:gd name="adj1" fmla="val -19228"/>
+            </a:avLst>
+          </a:prstGeom>
+          <a:ln w="12700">
+            <a:solidFill>
+              <a:schemeClr val="tx1"/>
+            </a:solidFill>
+            <a:tailEnd type="triangle"/>
+          </a:ln>
+          <a:effectLst/>
+        </p:spPr>
+        <p:style>
+          <a:lnRef idx="2">
+            <a:schemeClr val="accent1"/>
+          </a:lnRef>
+          <a:fillRef idx="0">
+            <a:schemeClr val="accent1"/>
+          </a:fillRef>
+          <a:effectRef idx="1">
+            <a:schemeClr val="accent1"/>
+          </a:effectRef>
+          <a:fontRef idx="minor">
+            <a:schemeClr val="tx1"/>
+          </a:fontRef>
+        </p:style>
+      </p:cxnSp>
+      <p:cxnSp>
+        <p:nvCxnSpPr>
+          <p:cNvPr id="604" name="Straight Arrow Connector 218"/>
+          <p:cNvCxnSpPr>
+            <a:stCxn id="598" idx="2"/>
+            <a:endCxn id="586" idx="0"/>
+          </p:cNvCxnSpPr>
+          <p:nvPr/>
+        </p:nvCxnSpPr>
+        <p:spPr>
+          <a:xfrm>
+            <a:off x="7131309" y="2284201"/>
+            <a:ext cx="0" cy="220001"/>
+          </a:xfrm>
+          <a:prstGeom prst="straightConnector1">
+            <a:avLst/>
+          </a:prstGeom>
+          <a:ln w="12700">
+            <a:solidFill>
+              <a:schemeClr val="tx1"/>
+            </a:solidFill>
+            <a:tailEnd type="triangle"/>
+          </a:ln>
+          <a:effectLst/>
+        </p:spPr>
+        <p:style>
+          <a:lnRef idx="2">
+            <a:schemeClr val="accent1"/>
+          </a:lnRef>
+          <a:fillRef idx="0">
+            <a:schemeClr val="accent1"/>
+          </a:fillRef>
+          <a:effectRef idx="1">
+            <a:schemeClr val="accent1"/>
+          </a:effectRef>
+          <a:fontRef idx="minor">
+            <a:schemeClr val="tx1"/>
+          </a:fontRef>
+        </p:style>
+      </p:cxnSp>
+      <p:grpSp>
+        <p:nvGrpSpPr>
+          <p:cNvPr id="605" name="Group 604"/>
+          <p:cNvGrpSpPr/>
+          <p:nvPr/>
+        </p:nvGrpSpPr>
+        <p:grpSpPr>
+          <a:xfrm>
+            <a:off x="1258933" y="1268760"/>
+            <a:ext cx="1523111" cy="1074935"/>
+            <a:chOff x="1258933" y="1268760"/>
+            <a:chExt cx="1523111" cy="1074935"/>
+          </a:xfrm>
+        </p:grpSpPr>
+        <p:grpSp>
+          <p:nvGrpSpPr>
+            <p:cNvPr id="606" name="Group 605"/>
+            <p:cNvGrpSpPr/>
+            <p:nvPr/>
+          </p:nvGrpSpPr>
+          <p:grpSpPr>
+            <a:xfrm>
+              <a:off x="1509504" y="1315341"/>
+              <a:ext cx="1019700" cy="968860"/>
+              <a:chOff x="405780" y="1290494"/>
+              <a:chExt cx="1019700" cy="968860"/>
+            </a:xfrm>
+          </p:grpSpPr>
+          <p:sp>
+            <p:nvSpPr>
+              <p:cNvPr id="608" name="Rounded Rectangle 607"/>
+              <p:cNvSpPr/>
+              <p:nvPr/>
+            </p:nvSpPr>
+            <p:spPr>
+              <a:xfrm>
+                <a:off x="405780" y="1290494"/>
+                <a:ext cx="1019700" cy="968860"/>
+              </a:xfrm>
+              <a:prstGeom prst="roundRect">
+                <a:avLst>
+                  <a:gd name="adj" fmla="val 8610"/>
+                </a:avLst>
+              </a:prstGeom>
+              <a:solidFill>
+                <a:schemeClr val="bg1">
+                  <a:lumMod val="85000"/>
+                </a:schemeClr>
+              </a:solidFill>
+              <a:ln w="38100" cmpd="sng">
+                <a:noFill/>
+              </a:ln>
+            </p:spPr>
+            <p:style>
+              <a:lnRef idx="2">
+                <a:schemeClr val="dk1"/>
+              </a:lnRef>
+              <a:fillRef idx="1">
+                <a:schemeClr val="lt1"/>
+              </a:fillRef>
+              <a:effectRef idx="0">
+                <a:schemeClr val="dk1"/>
+              </a:effectRef>
+              <a:fontRef idx="minor">
+                <a:schemeClr val="dk1"/>
+              </a:fontRef>
+            </p:style>
+            <p:txBody>
+              <a:bodyPr tIns="0" rtlCol="0" anchor="t" anchorCtr="0"/>
+              <a:lstStyle/>
+              <a:p>
+                <a:pPr algn="ctr"/>
+                <a:r>
+                  <a:rPr lang="en-US" sz="1400" dirty="0" smtClean="0">
+                    <a:cs typeface="Calibri Light"/>
+                  </a:rPr>
+                  <a:t>Customer</a:t>
+                </a:r>
+              </a:p>
+            </p:txBody>
+          </p:sp>
+          <p:sp>
+            <p:nvSpPr>
+              <p:cNvPr id="609" name="Rounded Rectangle 608"/>
+              <p:cNvSpPr/>
+              <p:nvPr/>
+            </p:nvSpPr>
+            <p:spPr>
+              <a:xfrm>
+                <a:off x="514804" y="1615846"/>
+                <a:ext cx="801652" cy="236223"/>
+              </a:xfrm>
+              <a:prstGeom prst="roundRect">
+                <a:avLst/>
+              </a:prstGeom>
+              <a:solidFill>
+                <a:srgbClr val="005586"/>
+              </a:solidFill>
+              <a:ln>
+                <a:solidFill>
+                  <a:srgbClr val="005586"/>
+                </a:solidFill>
+              </a:ln>
+            </p:spPr>
+            <p:style>
+              <a:lnRef idx="2">
+                <a:schemeClr val="dk1">
+                  <a:shade val="50000"/>
+                </a:schemeClr>
+              </a:lnRef>
+              <a:fillRef idx="1">
+                <a:schemeClr val="dk1"/>
+              </a:fillRef>
+              <a:effectRef idx="0">
+                <a:schemeClr val="dk1"/>
+              </a:effectRef>
+              <a:fontRef idx="minor">
+                <a:schemeClr val="lt1"/>
+              </a:fontRef>
+            </p:style>
+            <p:txBody>
+              <a:bodyPr rtlCol="0" anchor="ctr"/>
+              <a:lstStyle/>
+              <a:p>
+                <a:pPr algn="ctr"/>
+                <a:r>
+                  <a:rPr lang="en-US" sz="1000" dirty="0" smtClean="0">
+                    <a:cs typeface="Calibri Light"/>
+                  </a:rPr>
+                  <a:t>CDO</a:t>
+                </a:r>
+                <a:endParaRPr lang="en-US" sz="1000" dirty="0">
+                  <a:solidFill>
+                    <a:srgbClr val="29A7DE"/>
+                  </a:solidFill>
+                  <a:cs typeface="Calibri Light"/>
+                </a:endParaRPr>
+              </a:p>
+            </p:txBody>
+          </p:sp>
+          <p:sp>
+            <p:nvSpPr>
+              <p:cNvPr id="610" name="Rounded Rectangle 609"/>
+              <p:cNvSpPr/>
+              <p:nvPr/>
+            </p:nvSpPr>
+            <p:spPr>
+              <a:xfrm>
+                <a:off x="514804" y="1923835"/>
+                <a:ext cx="801652" cy="236223"/>
+              </a:xfrm>
+              <a:prstGeom prst="roundRect">
+                <a:avLst/>
+              </a:prstGeom>
+              <a:solidFill>
+                <a:srgbClr val="005586"/>
+              </a:solidFill>
+              <a:ln>
+                <a:solidFill>
+                  <a:srgbClr val="005586"/>
+                </a:solidFill>
+              </a:ln>
+            </p:spPr>
+            <p:style>
+              <a:lnRef idx="2">
+                <a:schemeClr val="dk1">
+                  <a:shade val="50000"/>
+                </a:schemeClr>
+              </a:lnRef>
+              <a:fillRef idx="1">
+                <a:schemeClr val="dk1"/>
+              </a:fillRef>
+              <a:effectRef idx="0">
+                <a:schemeClr val="dk1"/>
+              </a:effectRef>
+              <a:fontRef idx="minor">
+                <a:schemeClr val="lt1"/>
+              </a:fontRef>
+            </p:style>
+            <p:txBody>
+              <a:bodyPr rtlCol="0" anchor="ctr"/>
+              <a:lstStyle/>
+              <a:p>
+                <a:pPr algn="ctr"/>
+                <a:r>
+                  <a:rPr lang="en-US" sz="1000" dirty="0" smtClean="0">
+                    <a:cs typeface="Calibri Light"/>
+                  </a:rPr>
+                  <a:t>Director</a:t>
+                </a:r>
+                <a:endParaRPr lang="en-US" sz="1000" dirty="0">
+                  <a:solidFill>
+                    <a:srgbClr val="29A7DE"/>
+                  </a:solidFill>
+                  <a:cs typeface="Calibri Light"/>
+                </a:endParaRPr>
+              </a:p>
+            </p:txBody>
+          </p:sp>
+        </p:grpSp>
+        <p:sp>
+          <p:nvSpPr>
+            <p:cNvPr id="607" name="Double Brace 606"/>
+            <p:cNvSpPr/>
+            <p:nvPr/>
+          </p:nvSpPr>
+          <p:spPr>
+            <a:xfrm>
+              <a:off x="1258933" y="1268760"/>
+              <a:ext cx="1523111" cy="1074935"/>
+            </a:xfrm>
+            <a:prstGeom prst="bracePair">
+              <a:avLst/>
+            </a:prstGeom>
+            <a:ln w="16510">
+              <a:solidFill>
+                <a:schemeClr val="tx1"/>
+              </a:solidFill>
+            </a:ln>
+            <a:effectLst/>
+          </p:spPr>
+          <p:style>
+            <a:lnRef idx="2">
+              <a:schemeClr val="accent1"/>
+            </a:lnRef>
+            <a:fillRef idx="0">
+              <a:schemeClr val="accent1"/>
+            </a:fillRef>
+            <a:effectRef idx="1">
+              <a:schemeClr val="accent1"/>
+            </a:effectRef>
+            <a:fontRef idx="minor">
+              <a:schemeClr val="tx1"/>
+            </a:fontRef>
+          </p:style>
+          <p:txBody>
+            <a:bodyPr rtlCol="0" anchor="ctr"/>
+            <a:lstStyle/>
+            <a:p>
+              <a:pPr algn="ctr"/>
+              <a:endParaRPr lang="en-GB"/>
+            </a:p>
+          </p:txBody>
+        </p:sp>
+      </p:grpSp>
+      <p:cxnSp>
+        <p:nvCxnSpPr>
+          <p:cNvPr id="611" name="Straight Arrow Connector 218"/>
+          <p:cNvCxnSpPr>
+            <a:stCxn id="598" idx="2"/>
+            <a:endCxn id="579" idx="0"/>
+          </p:cNvCxnSpPr>
+          <p:nvPr/>
+        </p:nvCxnSpPr>
+        <p:spPr>
+          <a:xfrm rot="5400000">
+            <a:off x="5820422" y="1195834"/>
+            <a:ext cx="222520" cy="2399255"/>
+          </a:xfrm>
+          <a:prstGeom prst="bentConnector3">
+            <a:avLst>
+              <a:gd name="adj1" fmla="val 34291"/>
+            </a:avLst>
+          </a:prstGeom>
+          <a:ln w="12700">
+            <a:solidFill>
+              <a:schemeClr val="tx1"/>
+            </a:solidFill>
+            <a:tailEnd type="triangle"/>
+          </a:ln>
+          <a:effectLst/>
+        </p:spPr>
+        <p:style>
+          <a:lnRef idx="2">
+            <a:schemeClr val="accent1"/>
+          </a:lnRef>
+          <a:fillRef idx="0">
+            <a:schemeClr val="accent1"/>
+          </a:fillRef>
+          <a:effectRef idx="1">
+            <a:schemeClr val="accent1"/>
+          </a:effectRef>
+          <a:fontRef idx="minor">
+            <a:schemeClr val="tx1"/>
+          </a:fontRef>
+        </p:style>
+      </p:cxnSp>
+      <p:cxnSp>
+        <p:nvCxnSpPr>
+          <p:cNvPr id="612" name="Straight Arrow Connector 218"/>
+          <p:cNvCxnSpPr/>
+          <p:nvPr/>
+        </p:nvCxnSpPr>
+        <p:spPr>
+          <a:xfrm flipH="1">
+            <a:off x="5241904" y="1799771"/>
+            <a:ext cx="1379555" cy="0"/>
+          </a:xfrm>
+          <a:prstGeom prst="straightConnector1">
+            <a:avLst/>
+          </a:prstGeom>
+          <a:ln w="12700">
+            <a:solidFill>
+              <a:schemeClr val="tx1"/>
+            </a:solidFill>
+            <a:headEnd type="triangle"/>
+            <a:tailEnd type="triangle"/>
+          </a:ln>
+          <a:effectLst/>
+        </p:spPr>
+        <p:style>
+          <a:lnRef idx="2">
+            <a:schemeClr val="accent1"/>
+          </a:lnRef>
+          <a:fillRef idx="0">
+            <a:schemeClr val="accent1"/>
+          </a:fillRef>
+          <a:effectRef idx="1">
+            <a:schemeClr val="accent1"/>
+          </a:effectRef>
+          <a:fontRef idx="minor">
+            <a:schemeClr val="tx1"/>
+          </a:fontRef>
+        </p:style>
+      </p:cxnSp>
+      <p:cxnSp>
+        <p:nvCxnSpPr>
+          <p:cNvPr id="631" name="Straight Arrow Connector 255"/>
+          <p:cNvCxnSpPr>
+            <a:stCxn id="144" idx="2"/>
+            <a:endCxn id="152" idx="2"/>
+          </p:cNvCxnSpPr>
+          <p:nvPr/>
+        </p:nvCxnSpPr>
+        <p:spPr>
+          <a:xfrm rot="16200000" flipH="1">
+            <a:off x="5892964" y="5076164"/>
+            <a:ext cx="12700" cy="1904524"/>
+          </a:xfrm>
+          <a:prstGeom prst="bentConnector3">
+            <a:avLst>
+              <a:gd name="adj1" fmla="val 1800000"/>
+            </a:avLst>
+          </a:prstGeom>
+          <a:ln w="12700">
+            <a:solidFill>
+              <a:schemeClr val="tx1"/>
+            </a:solidFill>
+            <a:headEnd type="none"/>
+            <a:tailEnd type="triangle"/>
+          </a:ln>
+          <a:effectLst/>
+        </p:spPr>
+        <p:style>
+          <a:lnRef idx="2">
+            <a:schemeClr val="accent1"/>
+          </a:lnRef>
+          <a:fillRef idx="0">
+            <a:schemeClr val="accent1"/>
+          </a:fillRef>
+          <a:effectRef idx="1">
+            <a:schemeClr val="accent1"/>
+          </a:effectRef>
+          <a:fontRef idx="minor">
+            <a:schemeClr val="tx1"/>
+          </a:fontRef>
+        </p:style>
+      </p:cxnSp>
+      <p:cxnSp>
+        <p:nvCxnSpPr>
+          <p:cNvPr id="650" name="Straight Arrow Connector 255"/>
+          <p:cNvCxnSpPr>
+            <a:stCxn id="137" idx="1"/>
+          </p:cNvCxnSpPr>
+          <p:nvPr/>
+        </p:nvCxnSpPr>
+        <p:spPr>
+          <a:xfrm flipH="1">
+            <a:off x="1641504" y="5091525"/>
+            <a:ext cx="884824" cy="0"/>
+          </a:xfrm>
+          <a:prstGeom prst="straightConnector1">
+            <a:avLst/>
+          </a:prstGeom>
+          <a:ln w="12700">
+            <a:solidFill>
+              <a:schemeClr val="tx1"/>
+            </a:solidFill>
+            <a:headEnd type="triangle"/>
+            <a:tailEnd type="triangle"/>
+          </a:ln>
+          <a:effectLst/>
+        </p:spPr>
+        <p:style>
+          <a:lnRef idx="2">
+            <a:schemeClr val="accent1"/>
+          </a:lnRef>
+          <a:fillRef idx="0">
+            <a:schemeClr val="accent1"/>
+          </a:fillRef>
+          <a:effectRef idx="1">
+            <a:schemeClr val="accent1"/>
+          </a:effectRef>
+          <a:fontRef idx="minor">
+            <a:schemeClr val="tx1"/>
+          </a:fontRef>
+        </p:style>
+      </p:cxnSp>
+      <p:grpSp>
+        <p:nvGrpSpPr>
+          <p:cNvPr id="122" name="Group 121"/>
+          <p:cNvGrpSpPr/>
+          <p:nvPr/>
+        </p:nvGrpSpPr>
+        <p:grpSpPr>
+          <a:xfrm>
+            <a:off x="8239900" y="4154624"/>
+            <a:ext cx="1019700" cy="1873802"/>
+            <a:chOff x="10144424" y="4154624"/>
+            <a:chExt cx="1019700" cy="1873802"/>
+          </a:xfrm>
+        </p:grpSpPr>
+        <p:sp>
+          <p:nvSpPr>
+            <p:cNvPr id="123" name="Rounded Rectangle 122"/>
+            <p:cNvSpPr/>
+            <p:nvPr/>
+          </p:nvSpPr>
+          <p:spPr>
+            <a:xfrm>
+              <a:off x="10144424" y="4154624"/>
+              <a:ext cx="1019700" cy="1873802"/>
+            </a:xfrm>
+            <a:prstGeom prst="roundRect">
+              <a:avLst>
+                <a:gd name="adj" fmla="val 8610"/>
+              </a:avLst>
+            </a:prstGeom>
+            <a:solidFill>
+              <a:schemeClr val="bg1">
+                <a:lumMod val="85000"/>
+              </a:schemeClr>
+            </a:solidFill>
+            <a:ln w="38100" cmpd="sng">
+              <a:noFill/>
+            </a:ln>
+          </p:spPr>
+          <p:style>
+            <a:lnRef idx="2">
+              <a:schemeClr val="dk1"/>
+            </a:lnRef>
+            <a:fillRef idx="1">
+              <a:schemeClr val="lt1"/>
+            </a:fillRef>
+            <a:effectRef idx="0">
+              <a:schemeClr val="dk1"/>
+            </a:effectRef>
+            <a:fontRef idx="minor">
+              <a:schemeClr val="dk1"/>
+            </a:fontRef>
+          </p:style>
+          <p:txBody>
+            <a:bodyPr tIns="0" rtlCol="0" anchor="t" anchorCtr="0"/>
+            <a:lstStyle/>
+            <a:p>
+              <a:pPr algn="ctr"/>
+              <a:r>
+                <a:rPr lang="en-US" sz="1400" dirty="0" smtClean="0">
+                  <a:cs typeface="Calibri Light"/>
+                </a:rPr>
+                <a:t>Prod Clstr</a:t>
+              </a:r>
+              <a:endParaRPr lang="en-US" sz="1400" dirty="0" smtClean="0">
+                <a:cs typeface="Calibri Light"/>
+              </a:endParaRPr>
+            </a:p>
+          </p:txBody>
+        </p:sp>
+        <p:sp>
+          <p:nvSpPr>
+            <p:cNvPr id="124" name="Rounded Rectangle 123"/>
+            <p:cNvSpPr/>
+            <p:nvPr/>
+          </p:nvSpPr>
+          <p:spPr>
+            <a:xfrm>
+              <a:off x="10253448" y="4468964"/>
+              <a:ext cx="801652" cy="236223"/>
+            </a:xfrm>
+            <a:prstGeom prst="roundRect">
+              <a:avLst/>
+            </a:prstGeom>
+            <a:solidFill>
+              <a:srgbClr val="0078D9"/>
+            </a:solidFill>
+            <a:ln>
+              <a:solidFill>
+                <a:srgbClr val="0078D9"/>
+              </a:solidFill>
+            </a:ln>
+          </p:spPr>
+          <p:style>
+            <a:lnRef idx="2">
+              <a:schemeClr val="dk1">
+                <a:shade val="50000"/>
+              </a:schemeClr>
+            </a:lnRef>
+            <a:fillRef idx="1">
+              <a:schemeClr val="dk1"/>
+            </a:fillRef>
+            <a:effectRef idx="0">
+              <a:schemeClr val="dk1"/>
+            </a:effectRef>
+            <a:fontRef idx="minor">
+              <a:schemeClr val="lt1"/>
+            </a:fontRef>
+          </p:style>
+          <p:txBody>
+            <a:bodyPr rtlCol="0" anchor="ctr"/>
+            <a:lstStyle/>
+            <a:p>
+              <a:pPr algn="ctr"/>
+              <a:r>
+                <a:rPr lang="en-US" sz="1000" dirty="0" smtClean="0">
+                  <a:cs typeface="Calibri Light"/>
+                </a:rPr>
+                <a:t>Sys Test</a:t>
+              </a:r>
+              <a:endParaRPr lang="en-US" sz="1000" dirty="0">
+                <a:solidFill>
+                  <a:srgbClr val="29A7DE"/>
+                </a:solidFill>
+                <a:cs typeface="Calibri Light"/>
+              </a:endParaRPr>
+            </a:p>
+          </p:txBody>
+        </p:sp>
+        <p:sp>
+          <p:nvSpPr>
+            <p:cNvPr id="125" name="Rounded Rectangle 124"/>
+            <p:cNvSpPr/>
+            <p:nvPr/>
+          </p:nvSpPr>
+          <p:spPr>
+            <a:xfrm>
+              <a:off x="10253448" y="4776953"/>
+              <a:ext cx="801652" cy="236223"/>
+            </a:xfrm>
+            <a:prstGeom prst="roundRect">
+              <a:avLst/>
+            </a:prstGeom>
+            <a:solidFill>
+              <a:srgbClr val="0078D9"/>
+            </a:solidFill>
+            <a:ln>
+              <a:solidFill>
+                <a:srgbClr val="0078D9"/>
+              </a:solidFill>
+            </a:ln>
+          </p:spPr>
+          <p:style>
+            <a:lnRef idx="2">
+              <a:schemeClr val="dk1">
+                <a:shade val="50000"/>
+              </a:schemeClr>
+            </a:lnRef>
+            <a:fillRef idx="1">
+              <a:schemeClr val="dk1"/>
+            </a:fillRef>
+            <a:effectRef idx="0">
+              <a:schemeClr val="dk1"/>
+            </a:effectRef>
+            <a:fontRef idx="minor">
+              <a:schemeClr val="lt1"/>
+            </a:fontRef>
+          </p:style>
+          <p:txBody>
+            <a:bodyPr rtlCol="0" anchor="ctr"/>
+            <a:lstStyle/>
+            <a:p>
+              <a:pPr algn="ctr"/>
+              <a:r>
+                <a:rPr lang="en-US" sz="1000" dirty="0" err="1" smtClean="0">
+                  <a:cs typeface="Calibri Light"/>
+                </a:rPr>
+                <a:t>Regr</a:t>
+              </a:r>
+              <a:r>
+                <a:rPr lang="en-US" sz="1000" dirty="0" smtClean="0">
+                  <a:cs typeface="Calibri Light"/>
+                </a:rPr>
+                <a:t> Test</a:t>
+              </a:r>
+              <a:endParaRPr lang="en-US" sz="1000" dirty="0">
+                <a:solidFill>
+                  <a:srgbClr val="29A7DE"/>
+                </a:solidFill>
+                <a:cs typeface="Calibri Light"/>
+              </a:endParaRPr>
+            </a:p>
+          </p:txBody>
+        </p:sp>
+        <p:sp>
+          <p:nvSpPr>
+            <p:cNvPr id="126" name="Rounded Rectangle 125"/>
+            <p:cNvSpPr/>
+            <p:nvPr/>
+          </p:nvSpPr>
+          <p:spPr>
+            <a:xfrm>
+              <a:off x="10253448" y="5084942"/>
+              <a:ext cx="801652" cy="236223"/>
+            </a:xfrm>
+            <a:prstGeom prst="roundRect">
+              <a:avLst/>
+            </a:prstGeom>
+            <a:solidFill>
+              <a:srgbClr val="0078D9"/>
+            </a:solidFill>
+            <a:ln>
+              <a:solidFill>
+                <a:srgbClr val="0078D9"/>
+              </a:solidFill>
+            </a:ln>
+          </p:spPr>
+          <p:style>
+            <a:lnRef idx="2">
+              <a:schemeClr val="dk1">
+                <a:shade val="50000"/>
+              </a:schemeClr>
+            </a:lnRef>
+            <a:fillRef idx="1">
+              <a:schemeClr val="dk1"/>
+            </a:fillRef>
+            <a:effectRef idx="0">
+              <a:schemeClr val="dk1"/>
+            </a:effectRef>
+            <a:fontRef idx="minor">
+              <a:schemeClr val="lt1"/>
+            </a:fontRef>
+          </p:style>
+          <p:txBody>
+            <a:bodyPr rtlCol="0" anchor="ctr"/>
+            <a:lstStyle/>
+            <a:p>
+              <a:pPr algn="ctr"/>
+              <a:r>
+                <a:rPr lang="en-US" sz="1000" dirty="0" smtClean="0">
+                  <a:cs typeface="Calibri Light"/>
+                </a:rPr>
+                <a:t>Discovery</a:t>
+              </a:r>
+              <a:endParaRPr lang="en-US" sz="1000" dirty="0">
+                <a:solidFill>
+                  <a:srgbClr val="29A7DE"/>
+                </a:solidFill>
+                <a:cs typeface="Calibri Light"/>
+              </a:endParaRPr>
+            </a:p>
+          </p:txBody>
+        </p:sp>
+        <p:sp>
+          <p:nvSpPr>
+            <p:cNvPr id="127" name="Rounded Rectangle 126"/>
+            <p:cNvSpPr/>
+            <p:nvPr/>
+          </p:nvSpPr>
+          <p:spPr>
+            <a:xfrm>
+              <a:off x="10253448" y="5392931"/>
+              <a:ext cx="801652" cy="236223"/>
+            </a:xfrm>
+            <a:prstGeom prst="roundRect">
+              <a:avLst/>
+            </a:prstGeom>
+            <a:solidFill>
+              <a:srgbClr val="0078D9"/>
+            </a:solidFill>
+            <a:ln>
+              <a:solidFill>
+                <a:srgbClr val="0078D9"/>
+              </a:solidFill>
+            </a:ln>
+          </p:spPr>
+          <p:style>
+            <a:lnRef idx="2">
+              <a:schemeClr val="dk1">
+                <a:shade val="50000"/>
+              </a:schemeClr>
+            </a:lnRef>
+            <a:fillRef idx="1">
+              <a:schemeClr val="dk1"/>
+            </a:fillRef>
+            <a:effectRef idx="0">
+              <a:schemeClr val="dk1"/>
+            </a:effectRef>
+            <a:fontRef idx="minor">
+              <a:schemeClr val="lt1"/>
+            </a:fontRef>
+          </p:style>
+          <p:txBody>
+            <a:bodyPr rtlCol="0" anchor="ctr"/>
+            <a:lstStyle/>
+            <a:p>
+              <a:pPr algn="ctr"/>
+              <a:r>
+                <a:rPr lang="en-US" sz="1000" dirty="0" smtClean="0">
+                  <a:cs typeface="Calibri Light"/>
+                </a:rPr>
+                <a:t>Prod Data</a:t>
+              </a:r>
+              <a:endParaRPr lang="en-US" sz="1000" dirty="0">
+                <a:solidFill>
+                  <a:srgbClr val="29A7DE"/>
+                </a:solidFill>
+                <a:cs typeface="Calibri Light"/>
+              </a:endParaRPr>
+            </a:p>
+          </p:txBody>
+        </p:sp>
+        <p:sp>
+          <p:nvSpPr>
+            <p:cNvPr id="128" name="Rounded Rectangle 127"/>
+            <p:cNvSpPr/>
+            <p:nvPr/>
+          </p:nvSpPr>
+          <p:spPr>
+            <a:xfrm>
+              <a:off x="10253448" y="5700920"/>
+              <a:ext cx="801652" cy="236223"/>
+            </a:xfrm>
+            <a:prstGeom prst="roundRect">
+              <a:avLst/>
+            </a:prstGeom>
+            <a:solidFill>
+              <a:srgbClr val="0078D9"/>
+            </a:solidFill>
+            <a:ln>
+              <a:solidFill>
+                <a:srgbClr val="0078D9"/>
+              </a:solidFill>
+            </a:ln>
+          </p:spPr>
+          <p:style>
+            <a:lnRef idx="2">
+              <a:schemeClr val="dk1">
+                <a:shade val="50000"/>
+              </a:schemeClr>
+            </a:lnRef>
+            <a:fillRef idx="1">
+              <a:schemeClr val="dk1"/>
+            </a:fillRef>
+            <a:effectRef idx="0">
+              <a:schemeClr val="dk1"/>
+            </a:effectRef>
+            <a:fontRef idx="minor">
+              <a:schemeClr val="lt1"/>
+            </a:fontRef>
+          </p:style>
+          <p:txBody>
+            <a:bodyPr rtlCol="0" anchor="ctr"/>
+            <a:lstStyle/>
+            <a:p>
+              <a:pPr algn="ctr"/>
+              <a:r>
+                <a:rPr lang="en-US" sz="1000" dirty="0" smtClean="0">
+                  <a:cs typeface="Calibri Light"/>
+                </a:rPr>
+                <a:t>Manager</a:t>
+              </a:r>
+              <a:endParaRPr lang="en-US" sz="1000" dirty="0">
+                <a:solidFill>
+                  <a:srgbClr val="29A7DE"/>
+                </a:solidFill>
+                <a:cs typeface="Calibri Light"/>
+              </a:endParaRPr>
+            </a:p>
+          </p:txBody>
+        </p:sp>
+      </p:grpSp>
+      <p:grpSp>
+        <p:nvGrpSpPr>
+          <p:cNvPr id="136" name="Group 135"/>
+          <p:cNvGrpSpPr/>
+          <p:nvPr/>
+        </p:nvGrpSpPr>
+        <p:grpSpPr>
+          <a:xfrm>
+            <a:off x="2526328" y="4154624"/>
+            <a:ext cx="1019700" cy="1873802"/>
+            <a:chOff x="10144424" y="4154624"/>
+            <a:chExt cx="1019700" cy="1873802"/>
+          </a:xfrm>
+        </p:grpSpPr>
+        <p:sp>
+          <p:nvSpPr>
+            <p:cNvPr id="137" name="Rounded Rectangle 136"/>
+            <p:cNvSpPr/>
+            <p:nvPr/>
+          </p:nvSpPr>
+          <p:spPr>
+            <a:xfrm>
+              <a:off x="10144424" y="4154624"/>
+              <a:ext cx="1019700" cy="1873802"/>
+            </a:xfrm>
+            <a:prstGeom prst="roundRect">
+              <a:avLst>
+                <a:gd name="adj" fmla="val 8610"/>
+              </a:avLst>
+            </a:prstGeom>
+            <a:solidFill>
+              <a:schemeClr val="bg1">
+                <a:lumMod val="85000"/>
+              </a:schemeClr>
+            </a:solidFill>
+            <a:ln w="38100" cmpd="sng">
+              <a:noFill/>
+            </a:ln>
+          </p:spPr>
+          <p:style>
+            <a:lnRef idx="2">
+              <a:schemeClr val="dk1"/>
+            </a:lnRef>
+            <a:fillRef idx="1">
+              <a:schemeClr val="lt1"/>
+            </a:fillRef>
+            <a:effectRef idx="0">
+              <a:schemeClr val="dk1"/>
+            </a:effectRef>
+            <a:fontRef idx="minor">
+              <a:schemeClr val="dk1"/>
+            </a:fontRef>
+          </p:style>
+          <p:txBody>
+            <a:bodyPr tIns="0" rtlCol="0" anchor="t" anchorCtr="0"/>
+            <a:lstStyle/>
+            <a:p>
+              <a:pPr algn="ctr"/>
+              <a:r>
+                <a:rPr lang="en-US" sz="1400" dirty="0" smtClean="0">
+                  <a:cs typeface="Calibri Light"/>
+                </a:rPr>
+                <a:t>Mvn Rep</a:t>
+              </a:r>
+              <a:endParaRPr lang="en-US" sz="1400" dirty="0" smtClean="0">
+                <a:cs typeface="Calibri Light"/>
+              </a:endParaRPr>
+            </a:p>
+          </p:txBody>
+        </p:sp>
+        <p:sp>
+          <p:nvSpPr>
+            <p:cNvPr id="138" name="Rounded Rectangle 137"/>
+            <p:cNvSpPr/>
+            <p:nvPr/>
+          </p:nvSpPr>
+          <p:spPr>
+            <a:xfrm>
+              <a:off x="10253448" y="4468964"/>
+              <a:ext cx="801652" cy="236223"/>
+            </a:xfrm>
+            <a:prstGeom prst="roundRect">
+              <a:avLst/>
+            </a:prstGeom>
+            <a:solidFill>
+              <a:srgbClr val="0078D9"/>
+            </a:solidFill>
+            <a:ln>
+              <a:solidFill>
+                <a:srgbClr val="0078D9"/>
+              </a:solidFill>
+            </a:ln>
+          </p:spPr>
+          <p:style>
+            <a:lnRef idx="2">
+              <a:schemeClr val="dk1">
+                <a:shade val="50000"/>
+              </a:schemeClr>
+            </a:lnRef>
+            <a:fillRef idx="1">
+              <a:schemeClr val="dk1"/>
+            </a:fillRef>
+            <a:effectRef idx="0">
+              <a:schemeClr val="dk1"/>
+            </a:effectRef>
+            <a:fontRef idx="minor">
+              <a:schemeClr val="lt1"/>
+            </a:fontRef>
+          </p:style>
+          <p:txBody>
+            <a:bodyPr rtlCol="0" anchor="ctr"/>
+            <a:lstStyle/>
+            <a:p>
+              <a:pPr algn="ctr"/>
+              <a:r>
+                <a:rPr lang="en-US" sz="1000" dirty="0" smtClean="0">
+                  <a:cs typeface="Calibri Light"/>
+                </a:rPr>
+                <a:t>Apps</a:t>
+              </a:r>
+              <a:endParaRPr lang="en-US" sz="1000" dirty="0">
+                <a:solidFill>
+                  <a:srgbClr val="29A7DE"/>
+                </a:solidFill>
+                <a:cs typeface="Calibri Light"/>
+              </a:endParaRPr>
+            </a:p>
+          </p:txBody>
+        </p:sp>
+        <p:sp>
+          <p:nvSpPr>
+            <p:cNvPr id="139" name="Rounded Rectangle 138"/>
+            <p:cNvSpPr/>
+            <p:nvPr/>
+          </p:nvSpPr>
+          <p:spPr>
+            <a:xfrm>
+              <a:off x="10253448" y="4776953"/>
+              <a:ext cx="801652" cy="236223"/>
+            </a:xfrm>
+            <a:prstGeom prst="roundRect">
+              <a:avLst/>
+            </a:prstGeom>
+            <a:solidFill>
+              <a:srgbClr val="0078D9"/>
+            </a:solidFill>
+            <a:ln>
+              <a:solidFill>
+                <a:srgbClr val="0078D9"/>
+              </a:solidFill>
+            </a:ln>
+          </p:spPr>
+          <p:style>
+            <a:lnRef idx="2">
+              <a:schemeClr val="dk1">
+                <a:shade val="50000"/>
+              </a:schemeClr>
+            </a:lnRef>
+            <a:fillRef idx="1">
+              <a:schemeClr val="dk1"/>
+            </a:fillRef>
+            <a:effectRef idx="0">
+              <a:schemeClr val="dk1"/>
+            </a:effectRef>
+            <a:fontRef idx="minor">
+              <a:schemeClr val="lt1"/>
+            </a:fontRef>
+          </p:style>
+          <p:txBody>
+            <a:bodyPr rtlCol="0" anchor="ctr"/>
+            <a:lstStyle/>
+            <a:p>
+              <a:pPr algn="ctr"/>
+              <a:r>
+                <a:rPr lang="en-US" sz="1000" dirty="0" smtClean="0">
+                  <a:cs typeface="Calibri Light"/>
+                </a:rPr>
+                <a:t>Libraries</a:t>
+              </a:r>
+              <a:endParaRPr lang="en-US" sz="1000" dirty="0">
+                <a:solidFill>
+                  <a:srgbClr val="29A7DE"/>
+                </a:solidFill>
+                <a:cs typeface="Calibri Light"/>
+              </a:endParaRPr>
+            </a:p>
+          </p:txBody>
+        </p:sp>
+        <p:sp>
+          <p:nvSpPr>
+            <p:cNvPr id="140" name="Rounded Rectangle 139"/>
+            <p:cNvSpPr/>
+            <p:nvPr/>
+          </p:nvSpPr>
+          <p:spPr>
+            <a:xfrm>
+              <a:off x="10253448" y="5084942"/>
+              <a:ext cx="801652" cy="236223"/>
+            </a:xfrm>
+            <a:prstGeom prst="roundRect">
+              <a:avLst/>
+            </a:prstGeom>
+            <a:solidFill>
+              <a:srgbClr val="0078D9"/>
+            </a:solidFill>
+            <a:ln>
+              <a:solidFill>
+                <a:srgbClr val="0078D9"/>
+              </a:solidFill>
+            </a:ln>
+          </p:spPr>
+          <p:style>
+            <a:lnRef idx="2">
+              <a:schemeClr val="dk1">
+                <a:shade val="50000"/>
+              </a:schemeClr>
+            </a:lnRef>
+            <a:fillRef idx="1">
+              <a:schemeClr val="dk1"/>
+            </a:fillRef>
+            <a:effectRef idx="0">
+              <a:schemeClr val="dk1"/>
+            </a:effectRef>
+            <a:fontRef idx="minor">
+              <a:schemeClr val="lt1"/>
+            </a:fontRef>
+          </p:style>
+          <p:txBody>
+            <a:bodyPr rtlCol="0" anchor="ctr"/>
+            <a:lstStyle/>
+            <a:p>
+              <a:pPr algn="ctr"/>
+              <a:r>
+                <a:rPr lang="en-US" sz="1000" dirty="0" smtClean="0">
+                  <a:cs typeface="Calibri Light"/>
+                </a:rPr>
+                <a:t>BoM</a:t>
+              </a:r>
+              <a:endParaRPr lang="en-US" sz="1000" dirty="0">
+                <a:solidFill>
+                  <a:srgbClr val="29A7DE"/>
+                </a:solidFill>
+                <a:cs typeface="Calibri Light"/>
+              </a:endParaRPr>
+            </a:p>
+          </p:txBody>
+        </p:sp>
+        <p:sp>
+          <p:nvSpPr>
+            <p:cNvPr id="141" name="Rounded Rectangle 140"/>
+            <p:cNvSpPr/>
+            <p:nvPr/>
+          </p:nvSpPr>
+          <p:spPr>
+            <a:xfrm>
+              <a:off x="10253448" y="5392931"/>
+              <a:ext cx="801652" cy="236223"/>
+            </a:xfrm>
+            <a:prstGeom prst="roundRect">
+              <a:avLst/>
+            </a:prstGeom>
+            <a:solidFill>
+              <a:srgbClr val="0078D9"/>
+            </a:solidFill>
+            <a:ln>
+              <a:solidFill>
+                <a:srgbClr val="0078D9"/>
+              </a:solidFill>
+            </a:ln>
+          </p:spPr>
+          <p:style>
+            <a:lnRef idx="2">
+              <a:schemeClr val="dk1">
+                <a:shade val="50000"/>
+              </a:schemeClr>
+            </a:lnRef>
+            <a:fillRef idx="1">
+              <a:schemeClr val="dk1"/>
+            </a:fillRef>
+            <a:effectRef idx="0">
+              <a:schemeClr val="dk1"/>
+            </a:effectRef>
+            <a:fontRef idx="minor">
+              <a:schemeClr val="lt1"/>
+            </a:fontRef>
+          </p:style>
+          <p:txBody>
+            <a:bodyPr rtlCol="0" anchor="ctr"/>
+            <a:lstStyle/>
+            <a:p>
+              <a:pPr algn="ctr"/>
+              <a:r>
+                <a:rPr lang="en-US" sz="1000" dirty="0" smtClean="0">
+                  <a:cs typeface="Calibri Light"/>
+                </a:rPr>
+                <a:t>JAR</a:t>
+              </a:r>
+              <a:endParaRPr lang="en-US" sz="1000" dirty="0">
+                <a:solidFill>
+                  <a:srgbClr val="29A7DE"/>
+                </a:solidFill>
+                <a:cs typeface="Calibri Light"/>
+              </a:endParaRPr>
+            </a:p>
+          </p:txBody>
+        </p:sp>
+        <p:sp>
+          <p:nvSpPr>
+            <p:cNvPr id="142" name="Rounded Rectangle 141"/>
+            <p:cNvSpPr/>
+            <p:nvPr/>
+          </p:nvSpPr>
+          <p:spPr>
+            <a:xfrm>
+              <a:off x="10253448" y="5700920"/>
+              <a:ext cx="801652" cy="236223"/>
+            </a:xfrm>
+            <a:prstGeom prst="roundRect">
+              <a:avLst/>
+            </a:prstGeom>
+            <a:solidFill>
+              <a:srgbClr val="0078D9"/>
+            </a:solidFill>
+            <a:ln>
+              <a:solidFill>
+                <a:srgbClr val="0078D9"/>
+              </a:solidFill>
+            </a:ln>
+          </p:spPr>
+          <p:style>
+            <a:lnRef idx="2">
+              <a:schemeClr val="dk1">
+                <a:shade val="50000"/>
+              </a:schemeClr>
+            </a:lnRef>
+            <a:fillRef idx="1">
+              <a:schemeClr val="dk1"/>
+            </a:fillRef>
+            <a:effectRef idx="0">
+              <a:schemeClr val="dk1"/>
+            </a:effectRef>
+            <a:fontRef idx="minor">
+              <a:schemeClr val="lt1"/>
+            </a:fontRef>
+          </p:style>
+          <p:txBody>
+            <a:bodyPr rtlCol="0" anchor="ctr"/>
+            <a:lstStyle/>
+            <a:p>
+              <a:pPr algn="ctr"/>
+              <a:r>
+                <a:rPr lang="en-US" sz="1000" dirty="0" smtClean="0">
+                  <a:cs typeface="Calibri Light"/>
+                </a:rPr>
+                <a:t>Parcel</a:t>
+              </a:r>
+              <a:endParaRPr lang="en-US" sz="1000" dirty="0">
+                <a:solidFill>
+                  <a:srgbClr val="29A7DE"/>
+                </a:solidFill>
+                <a:cs typeface="Calibri Light"/>
+              </a:endParaRPr>
+            </a:p>
+          </p:txBody>
+        </p:sp>
+      </p:grpSp>
+      <p:grpSp>
+        <p:nvGrpSpPr>
+          <p:cNvPr id="143" name="Group 142"/>
+          <p:cNvGrpSpPr/>
+          <p:nvPr/>
+        </p:nvGrpSpPr>
+        <p:grpSpPr>
+          <a:xfrm>
+            <a:off x="4430852" y="3835622"/>
+            <a:ext cx="1019700" cy="2192804"/>
+            <a:chOff x="6958508" y="1164188"/>
+            <a:chExt cx="1019700" cy="2192804"/>
+          </a:xfrm>
+        </p:grpSpPr>
+        <p:sp>
+          <p:nvSpPr>
+            <p:cNvPr id="144" name="Rounded Rectangle 143"/>
+            <p:cNvSpPr/>
+            <p:nvPr/>
+          </p:nvSpPr>
+          <p:spPr>
+            <a:xfrm>
+              <a:off x="6958508" y="1164188"/>
+              <a:ext cx="1019700" cy="2192804"/>
+            </a:xfrm>
+            <a:prstGeom prst="roundRect">
+              <a:avLst>
+                <a:gd name="adj" fmla="val 8610"/>
+              </a:avLst>
+            </a:prstGeom>
+            <a:solidFill>
+              <a:schemeClr val="bg1">
+                <a:lumMod val="85000"/>
+              </a:schemeClr>
+            </a:solidFill>
+            <a:ln w="38100" cmpd="sng">
+              <a:noFill/>
+            </a:ln>
+          </p:spPr>
+          <p:style>
+            <a:lnRef idx="2">
+              <a:schemeClr val="dk1"/>
+            </a:lnRef>
+            <a:fillRef idx="1">
+              <a:schemeClr val="lt1"/>
+            </a:fillRef>
+            <a:effectRef idx="0">
+              <a:schemeClr val="dk1"/>
+            </a:effectRef>
+            <a:fontRef idx="minor">
+              <a:schemeClr val="dk1"/>
+            </a:fontRef>
+          </p:style>
+          <p:txBody>
+            <a:bodyPr tIns="0" rtlCol="0" anchor="t" anchorCtr="0"/>
+            <a:lstStyle/>
+            <a:p>
+              <a:pPr algn="ctr"/>
+              <a:r>
+                <a:rPr lang="en-US" sz="1400" dirty="0" smtClean="0">
+                  <a:cs typeface="Calibri Light"/>
+                </a:rPr>
+                <a:t>Test Clstr</a:t>
+              </a:r>
+              <a:endParaRPr lang="en-US" sz="1400" dirty="0" smtClean="0">
+                <a:cs typeface="Calibri Light"/>
+              </a:endParaRPr>
+            </a:p>
+          </p:txBody>
+        </p:sp>
+        <p:sp>
+          <p:nvSpPr>
+            <p:cNvPr id="145" name="Rounded Rectangle 144"/>
+            <p:cNvSpPr/>
+            <p:nvPr/>
+          </p:nvSpPr>
+          <p:spPr>
+            <a:xfrm>
+              <a:off x="7067532" y="1489541"/>
+              <a:ext cx="801652" cy="236223"/>
+            </a:xfrm>
+            <a:prstGeom prst="roundRect">
+              <a:avLst/>
+            </a:prstGeom>
+            <a:solidFill>
+              <a:schemeClr val="tx2"/>
+            </a:solidFill>
+            <a:ln>
+              <a:solidFill>
+                <a:schemeClr val="tx2"/>
+              </a:solidFill>
+            </a:ln>
+          </p:spPr>
+          <p:style>
+            <a:lnRef idx="2">
+              <a:schemeClr val="dk1">
+                <a:shade val="50000"/>
+              </a:schemeClr>
+            </a:lnRef>
+            <a:fillRef idx="1">
+              <a:schemeClr val="dk1"/>
+            </a:fillRef>
+            <a:effectRef idx="0">
+              <a:schemeClr val="dk1"/>
+            </a:effectRef>
+            <a:fontRef idx="minor">
+              <a:schemeClr val="lt1"/>
+            </a:fontRef>
+          </p:style>
+          <p:txBody>
+            <a:bodyPr rtlCol="0" anchor="ctr"/>
+            <a:lstStyle/>
+            <a:p>
+              <a:pPr algn="ctr"/>
+              <a:r>
+                <a:rPr lang="en-US" sz="1000" dirty="0" smtClean="0">
+                  <a:cs typeface="Calibri Light"/>
+                </a:rPr>
+                <a:t>Sys Test</a:t>
+              </a:r>
+              <a:endParaRPr lang="en-US" sz="1000" dirty="0">
+                <a:solidFill>
+                  <a:srgbClr val="29A7DE"/>
+                </a:solidFill>
+                <a:cs typeface="Calibri Light"/>
+              </a:endParaRPr>
+            </a:p>
+          </p:txBody>
+        </p:sp>
+        <p:sp>
+          <p:nvSpPr>
+            <p:cNvPr id="146" name="Rounded Rectangle 145"/>
+            <p:cNvSpPr/>
+            <p:nvPr/>
+          </p:nvSpPr>
+          <p:spPr>
+            <a:xfrm>
+              <a:off x="7067532" y="1797530"/>
+              <a:ext cx="801652" cy="236223"/>
+            </a:xfrm>
+            <a:prstGeom prst="roundRect">
+              <a:avLst/>
+            </a:prstGeom>
+            <a:solidFill>
+              <a:schemeClr val="tx2"/>
+            </a:solidFill>
+            <a:ln>
+              <a:solidFill>
+                <a:schemeClr val="tx2"/>
+              </a:solidFill>
+            </a:ln>
+          </p:spPr>
+          <p:style>
+            <a:lnRef idx="2">
+              <a:schemeClr val="dk1">
+                <a:shade val="50000"/>
+              </a:schemeClr>
+            </a:lnRef>
+            <a:fillRef idx="1">
+              <a:schemeClr val="dk1"/>
+            </a:fillRef>
+            <a:effectRef idx="0">
+              <a:schemeClr val="dk1"/>
+            </a:effectRef>
+            <a:fontRef idx="minor">
+              <a:schemeClr val="lt1"/>
+            </a:fontRef>
+          </p:style>
+          <p:txBody>
+            <a:bodyPr rtlCol="0" anchor="ctr"/>
+            <a:lstStyle/>
+            <a:p>
+              <a:pPr algn="ctr"/>
+              <a:r>
+                <a:rPr lang="en-US" sz="1000" dirty="0" err="1" smtClean="0">
+                  <a:cs typeface="Calibri Light"/>
+                </a:rPr>
+                <a:t>Int</a:t>
+              </a:r>
+              <a:r>
+                <a:rPr lang="en-US" sz="1000" dirty="0" smtClean="0">
+                  <a:cs typeface="Calibri Light"/>
+                </a:rPr>
+                <a:t> Test</a:t>
+              </a:r>
+              <a:endParaRPr lang="en-US" sz="1000" dirty="0">
+                <a:solidFill>
+                  <a:srgbClr val="29A7DE"/>
+                </a:solidFill>
+                <a:cs typeface="Calibri Light"/>
+              </a:endParaRPr>
+            </a:p>
+          </p:txBody>
+        </p:sp>
+        <p:sp>
+          <p:nvSpPr>
+            <p:cNvPr id="147" name="Rounded Rectangle 146"/>
+            <p:cNvSpPr/>
+            <p:nvPr/>
+          </p:nvSpPr>
+          <p:spPr>
+            <a:xfrm>
+              <a:off x="7067532" y="2105519"/>
+              <a:ext cx="801652" cy="236223"/>
+            </a:xfrm>
+            <a:prstGeom prst="roundRect">
+              <a:avLst/>
+            </a:prstGeom>
+            <a:solidFill>
+              <a:schemeClr val="tx2"/>
+            </a:solidFill>
+            <a:ln>
+              <a:solidFill>
+                <a:schemeClr val="tx2"/>
+              </a:solidFill>
+            </a:ln>
+          </p:spPr>
+          <p:style>
+            <a:lnRef idx="2">
+              <a:schemeClr val="dk1">
+                <a:shade val="50000"/>
+              </a:schemeClr>
+            </a:lnRef>
+            <a:fillRef idx="1">
+              <a:schemeClr val="dk1"/>
+            </a:fillRef>
+            <a:effectRef idx="0">
+              <a:schemeClr val="dk1"/>
+            </a:effectRef>
+            <a:fontRef idx="minor">
+              <a:schemeClr val="lt1"/>
+            </a:fontRef>
+          </p:style>
+          <p:txBody>
+            <a:bodyPr rtlCol="0" anchor="ctr"/>
+            <a:lstStyle/>
+            <a:p>
+              <a:pPr algn="ctr"/>
+              <a:r>
+                <a:rPr lang="en-US" sz="1000" dirty="0" smtClean="0">
+                  <a:cs typeface="Calibri Light"/>
+                </a:rPr>
+                <a:t>Synth Data</a:t>
+              </a:r>
+              <a:endParaRPr lang="en-US" sz="1000" dirty="0">
+                <a:solidFill>
+                  <a:srgbClr val="29A7DE"/>
+                </a:solidFill>
+                <a:cs typeface="Calibri Light"/>
+              </a:endParaRPr>
+            </a:p>
+          </p:txBody>
+        </p:sp>
+        <p:sp>
+          <p:nvSpPr>
+            <p:cNvPr id="148" name="Rounded Rectangle 147"/>
+            <p:cNvSpPr/>
+            <p:nvPr/>
+          </p:nvSpPr>
+          <p:spPr>
+            <a:xfrm>
+              <a:off x="7067532" y="2413508"/>
+              <a:ext cx="801652" cy="236223"/>
+            </a:xfrm>
+            <a:prstGeom prst="roundRect">
+              <a:avLst/>
+            </a:prstGeom>
+            <a:solidFill>
+              <a:schemeClr val="tx2"/>
+            </a:solidFill>
+            <a:ln>
+              <a:solidFill>
+                <a:schemeClr val="tx2"/>
+              </a:solidFill>
+            </a:ln>
+          </p:spPr>
+          <p:style>
+            <a:lnRef idx="2">
+              <a:schemeClr val="dk1">
+                <a:shade val="50000"/>
+              </a:schemeClr>
+            </a:lnRef>
+            <a:fillRef idx="1">
+              <a:schemeClr val="dk1"/>
+            </a:fillRef>
+            <a:effectRef idx="0">
+              <a:schemeClr val="dk1"/>
+            </a:effectRef>
+            <a:fontRef idx="minor">
+              <a:schemeClr val="lt1"/>
+            </a:fontRef>
+          </p:style>
+          <p:txBody>
+            <a:bodyPr rtlCol="0" anchor="ctr"/>
+            <a:lstStyle/>
+            <a:p>
+              <a:pPr algn="ctr"/>
+              <a:r>
+                <a:rPr lang="en-US" sz="1000" dirty="0" smtClean="0">
+                  <a:cs typeface="Calibri Light"/>
+                </a:rPr>
+                <a:t>Sub Data</a:t>
+              </a:r>
+              <a:endParaRPr lang="en-US" sz="1000" dirty="0">
+                <a:solidFill>
+                  <a:srgbClr val="29A7DE"/>
+                </a:solidFill>
+                <a:cs typeface="Calibri Light"/>
+              </a:endParaRPr>
+            </a:p>
+          </p:txBody>
+        </p:sp>
+        <p:sp>
+          <p:nvSpPr>
+            <p:cNvPr id="149" name="Rounded Rectangle 148"/>
+            <p:cNvSpPr/>
+            <p:nvPr/>
+          </p:nvSpPr>
+          <p:spPr>
+            <a:xfrm>
+              <a:off x="7067532" y="2721497"/>
+              <a:ext cx="801652" cy="236223"/>
+            </a:xfrm>
+            <a:prstGeom prst="roundRect">
+              <a:avLst/>
+            </a:prstGeom>
+            <a:solidFill>
+              <a:schemeClr val="tx2"/>
+            </a:solidFill>
+            <a:ln>
+              <a:solidFill>
+                <a:schemeClr val="tx2"/>
+              </a:solidFill>
+            </a:ln>
+          </p:spPr>
+          <p:style>
+            <a:lnRef idx="2">
+              <a:schemeClr val="dk1">
+                <a:shade val="50000"/>
+              </a:schemeClr>
+            </a:lnRef>
+            <a:fillRef idx="1">
+              <a:schemeClr val="dk1"/>
+            </a:fillRef>
+            <a:effectRef idx="0">
+              <a:schemeClr val="dk1"/>
+            </a:effectRef>
+            <a:fontRef idx="minor">
+              <a:schemeClr val="lt1"/>
+            </a:fontRef>
+          </p:style>
+          <p:txBody>
+            <a:bodyPr rtlCol="0" anchor="ctr"/>
+            <a:lstStyle/>
+            <a:p>
+              <a:pPr algn="ctr"/>
+              <a:r>
+                <a:rPr lang="en-US" sz="1000" dirty="0" smtClean="0">
+                  <a:cs typeface="Calibri Light"/>
+                </a:rPr>
+                <a:t>CI Server</a:t>
+              </a:r>
+              <a:endParaRPr lang="en-US" sz="1000" dirty="0">
+                <a:solidFill>
+                  <a:srgbClr val="29A7DE"/>
+                </a:solidFill>
+                <a:cs typeface="Calibri Light"/>
+              </a:endParaRPr>
+            </a:p>
+          </p:txBody>
+        </p:sp>
+        <p:sp>
+          <p:nvSpPr>
+            <p:cNvPr id="150" name="Rounded Rectangle 149"/>
+            <p:cNvSpPr/>
+            <p:nvPr/>
+          </p:nvSpPr>
+          <p:spPr>
+            <a:xfrm>
+              <a:off x="7067532" y="3029486"/>
+              <a:ext cx="801652" cy="236223"/>
+            </a:xfrm>
+            <a:prstGeom prst="roundRect">
+              <a:avLst/>
+            </a:prstGeom>
+            <a:solidFill>
+              <a:schemeClr val="tx2"/>
+            </a:solidFill>
+            <a:ln>
+              <a:solidFill>
+                <a:schemeClr val="tx2"/>
+              </a:solidFill>
+            </a:ln>
+          </p:spPr>
+          <p:style>
+            <a:lnRef idx="2">
+              <a:schemeClr val="dk1">
+                <a:shade val="50000"/>
+              </a:schemeClr>
+            </a:lnRef>
+            <a:fillRef idx="1">
+              <a:schemeClr val="dk1"/>
+            </a:fillRef>
+            <a:effectRef idx="0">
+              <a:schemeClr val="dk1"/>
+            </a:effectRef>
+            <a:fontRef idx="minor">
+              <a:schemeClr val="lt1"/>
+            </a:fontRef>
+          </p:style>
+          <p:txBody>
+            <a:bodyPr rtlCol="0" anchor="ctr"/>
+            <a:lstStyle/>
+            <a:p>
+              <a:pPr algn="ctr"/>
+              <a:r>
+                <a:rPr lang="en-US" sz="1000" dirty="0" smtClean="0">
+                  <a:cs typeface="Calibri Light"/>
+                </a:rPr>
+                <a:t>Manager</a:t>
+              </a:r>
+              <a:endParaRPr lang="en-US" sz="1000" dirty="0">
+                <a:solidFill>
+                  <a:srgbClr val="29A7DE"/>
+                </a:solidFill>
+                <a:cs typeface="Calibri Light"/>
+              </a:endParaRPr>
+            </a:p>
+          </p:txBody>
+        </p:sp>
+      </p:grpSp>
+      <p:grpSp>
+        <p:nvGrpSpPr>
+          <p:cNvPr id="151" name="Group 150"/>
+          <p:cNvGrpSpPr/>
+          <p:nvPr/>
+        </p:nvGrpSpPr>
+        <p:grpSpPr>
+          <a:xfrm>
+            <a:off x="6335376" y="5059566"/>
+            <a:ext cx="1019700" cy="968860"/>
+            <a:chOff x="405780" y="1290494"/>
+            <a:chExt cx="1019700" cy="968860"/>
+          </a:xfrm>
+        </p:grpSpPr>
+        <p:sp>
+          <p:nvSpPr>
+            <p:cNvPr id="152" name="Rounded Rectangle 151"/>
+            <p:cNvSpPr/>
+            <p:nvPr/>
+          </p:nvSpPr>
+          <p:spPr>
+            <a:xfrm>
+              <a:off x="405780" y="1290494"/>
+              <a:ext cx="1019700" cy="968860"/>
+            </a:xfrm>
+            <a:prstGeom prst="roundRect">
+              <a:avLst>
+                <a:gd name="adj" fmla="val 8610"/>
+              </a:avLst>
+            </a:prstGeom>
+            <a:solidFill>
+              <a:schemeClr val="bg1">
+                <a:lumMod val="85000"/>
+              </a:schemeClr>
+            </a:solidFill>
+            <a:ln w="38100" cmpd="sng">
+              <a:noFill/>
+            </a:ln>
+          </p:spPr>
+          <p:style>
+            <a:lnRef idx="2">
+              <a:schemeClr val="dk1"/>
+            </a:lnRef>
+            <a:fillRef idx="1">
+              <a:schemeClr val="lt1"/>
+            </a:fillRef>
+            <a:effectRef idx="0">
+              <a:schemeClr val="dk1"/>
+            </a:effectRef>
+            <a:fontRef idx="minor">
+              <a:schemeClr val="dk1"/>
+            </a:fontRef>
+          </p:style>
+          <p:txBody>
+            <a:bodyPr tIns="0" rtlCol="0" anchor="t" anchorCtr="0"/>
+            <a:lstStyle/>
+            <a:p>
+              <a:pPr algn="ctr"/>
+              <a:r>
+                <a:rPr lang="en-US" sz="1400" dirty="0" smtClean="0">
+                  <a:cs typeface="Calibri Light"/>
+                </a:rPr>
+                <a:t>Parcel Rep</a:t>
+              </a:r>
+              <a:endParaRPr lang="en-US" sz="1400" dirty="0" smtClean="0">
+                <a:cs typeface="Calibri Light"/>
+              </a:endParaRPr>
+            </a:p>
+          </p:txBody>
+        </p:sp>
+        <p:sp>
+          <p:nvSpPr>
+            <p:cNvPr id="153" name="Rounded Rectangle 152"/>
+            <p:cNvSpPr/>
+            <p:nvPr/>
+          </p:nvSpPr>
+          <p:spPr>
+            <a:xfrm>
+              <a:off x="514804" y="1615846"/>
+              <a:ext cx="801652" cy="236223"/>
+            </a:xfrm>
+            <a:prstGeom prst="roundRect">
+              <a:avLst/>
+            </a:prstGeom>
+            <a:solidFill>
+              <a:schemeClr val="tx1"/>
+            </a:solidFill>
+            <a:ln>
+              <a:solidFill>
+                <a:schemeClr val="tx1"/>
+              </a:solidFill>
+            </a:ln>
+          </p:spPr>
+          <p:style>
+            <a:lnRef idx="2">
+              <a:schemeClr val="dk1">
+                <a:shade val="50000"/>
+              </a:schemeClr>
+            </a:lnRef>
+            <a:fillRef idx="1">
+              <a:schemeClr val="dk1"/>
+            </a:fillRef>
+            <a:effectRef idx="0">
+              <a:schemeClr val="dk1"/>
+            </a:effectRef>
+            <a:fontRef idx="minor">
+              <a:schemeClr val="lt1"/>
+            </a:fontRef>
+          </p:style>
+          <p:txBody>
+            <a:bodyPr rtlCol="0" anchor="ctr"/>
+            <a:lstStyle/>
+            <a:p>
+              <a:pPr algn="ctr"/>
+              <a:r>
+                <a:rPr lang="en-US" sz="1000" dirty="0" smtClean="0">
+                  <a:cs typeface="Calibri Light"/>
+                </a:rPr>
+                <a:t>Parcel</a:t>
+              </a:r>
+              <a:endParaRPr lang="en-US" sz="1000" dirty="0">
+                <a:solidFill>
+                  <a:srgbClr val="29A7DE"/>
+                </a:solidFill>
+                <a:cs typeface="Calibri Light"/>
+              </a:endParaRPr>
+            </a:p>
+          </p:txBody>
+        </p:sp>
+        <p:sp>
+          <p:nvSpPr>
+            <p:cNvPr id="154" name="Rounded Rectangle 153"/>
+            <p:cNvSpPr/>
+            <p:nvPr/>
+          </p:nvSpPr>
+          <p:spPr>
+            <a:xfrm>
+              <a:off x="514804" y="1923835"/>
+              <a:ext cx="801652" cy="236223"/>
+            </a:xfrm>
+            <a:prstGeom prst="roundRect">
+              <a:avLst/>
+            </a:prstGeom>
+            <a:solidFill>
+              <a:schemeClr val="tx1"/>
+            </a:solidFill>
+            <a:ln>
+              <a:solidFill>
+                <a:schemeClr val="tx1"/>
+              </a:solidFill>
+            </a:ln>
+          </p:spPr>
+          <p:style>
+            <a:lnRef idx="2">
+              <a:schemeClr val="dk1">
+                <a:shade val="50000"/>
+              </a:schemeClr>
+            </a:lnRef>
+            <a:fillRef idx="1">
+              <a:schemeClr val="dk1"/>
+            </a:fillRef>
+            <a:effectRef idx="0">
+              <a:schemeClr val="dk1"/>
+            </a:effectRef>
+            <a:fontRef idx="minor">
+              <a:schemeClr val="lt1"/>
+            </a:fontRef>
+          </p:style>
+          <p:txBody>
+            <a:bodyPr rtlCol="0" anchor="ctr"/>
+            <a:lstStyle/>
+            <a:p>
+              <a:pPr algn="ctr"/>
+              <a:r>
+                <a:rPr lang="en-US" sz="1000" dirty="0" smtClean="0">
+                  <a:cs typeface="Calibri Light"/>
+                </a:rPr>
+                <a:t>CSD</a:t>
+              </a:r>
+              <a:endParaRPr lang="en-US" sz="1000" dirty="0">
+                <a:solidFill>
+                  <a:srgbClr val="29A7DE"/>
+                </a:solidFill>
+                <a:cs typeface="Calibri Light"/>
+              </a:endParaRPr>
+            </a:p>
+          </p:txBody>
+        </p:sp>
+      </p:grpSp>
+      <p:cxnSp>
+        <p:nvCxnSpPr>
+          <p:cNvPr id="161" name="Straight Arrow Connector 255"/>
+          <p:cNvCxnSpPr>
+            <a:endCxn id="137" idx="3"/>
+          </p:cNvCxnSpPr>
+          <p:nvPr/>
+        </p:nvCxnSpPr>
+        <p:spPr>
+          <a:xfrm flipH="1">
+            <a:off x="3546028" y="5091525"/>
+            <a:ext cx="884824" cy="0"/>
+          </a:xfrm>
+          <a:prstGeom prst="straightConnector1">
+            <a:avLst/>
+          </a:prstGeom>
+          <a:ln w="12700">
+            <a:solidFill>
+              <a:schemeClr val="tx1"/>
+            </a:solidFill>
+            <a:headEnd type="none"/>
+            <a:tailEnd type="triangle"/>
+          </a:ln>
+          <a:effectLst/>
+        </p:spPr>
+        <p:style>
+          <a:lnRef idx="2">
+            <a:schemeClr val="accent1"/>
+          </a:lnRef>
+          <a:fillRef idx="0">
+            <a:schemeClr val="accent1"/>
+          </a:fillRef>
+          <a:effectRef idx="1">
+            <a:schemeClr val="accent1"/>
+          </a:effectRef>
+          <a:fontRef idx="minor">
+            <a:schemeClr val="tx1"/>
+          </a:fontRef>
+        </p:style>
+      </p:cxnSp>
+      <p:cxnSp>
+        <p:nvCxnSpPr>
+          <p:cNvPr id="169" name="Straight Arrow Connector 255"/>
+          <p:cNvCxnSpPr>
+            <a:stCxn id="152" idx="2"/>
+            <a:endCxn id="396" idx="2"/>
+          </p:cNvCxnSpPr>
+          <p:nvPr/>
+        </p:nvCxnSpPr>
+        <p:spPr>
+          <a:xfrm rot="16200000" flipH="1">
+            <a:off x="8749750" y="4123902"/>
+            <a:ext cx="12700" cy="3809048"/>
+          </a:xfrm>
+          <a:prstGeom prst="bentConnector3">
+            <a:avLst>
+              <a:gd name="adj1" fmla="val 1800000"/>
+            </a:avLst>
+          </a:prstGeom>
+          <a:ln w="12700">
+            <a:solidFill>
+              <a:schemeClr val="tx1"/>
+            </a:solidFill>
+            <a:headEnd type="triangle"/>
+            <a:tailEnd type="none"/>
+          </a:ln>
+          <a:effectLst/>
+        </p:spPr>
+        <p:style>
+          <a:lnRef idx="2">
+            <a:schemeClr val="accent1"/>
+          </a:lnRef>
+          <a:fillRef idx="0">
+            <a:schemeClr val="accent1"/>
+          </a:fillRef>
+          <a:effectRef idx="1">
+            <a:schemeClr val="accent1"/>
+          </a:effectRef>
+          <a:fontRef idx="minor">
+            <a:schemeClr val="tx1"/>
+          </a:fontRef>
+        </p:style>
+      </p:cxnSp>
+    </p:spTree>
+    <p:extLst>
+      <p:ext uri="{BB962C8B-B14F-4D97-AF65-F5344CB8AC3E}">
+        <p14:creationId xmlns:p14="http://schemas.microsoft.com/office/powerpoint/2010/main" val="2414546816"/>
+      </p:ext>
+    </p:extLst>
+  </p:cSld>
+  <p:clrMapOvr>
+    <a:masterClrMapping/>
+  </p:clrMapOvr>
+  <mc:AlternateContent xmlns:mc="http://schemas.openxmlformats.org/markup-compatibility/2006" xmlns:p14="http://schemas.microsoft.com/office/powerpoint/2010/main">
+    <mc:Choice Requires="p14">
+      <p:transition spd="med" p14:dur="700">
+        <p:fade/>
+      </p:transition>
+    </mc:Choice>
+    <mc:Fallback xmlns="">
+      <p:transition xmlns:p14="http://schemas.microsoft.com/office/powerpoint/2010/main" spd="med">
+        <p:fade/>
+      </p:transition>
+    </mc:Fallback>
+  </mc:AlternateContent>
+  <p:timing>
+    <p:tnLst>
+      <p:par>
+        <p:cTn xmlns:p14="http://schemas.microsoft.com/office/powerpoint/2010/main" id="1" dur="indefinite" restart="never" nodeType="tmRoot">
+          <p:childTnLst>
+            <p:seq concurrent="1" nextAc="seek">
+              <p:cTn id="2" dur="indefinite" nodeType="mainSeq">
+                <p:childTnLst>
+                  <p:par>
+                    <p:cTn id="3" fill="hold">
+                      <p:stCondLst>
+                        <p:cond delay="indefinite"/>
+                        <p:cond evt="onBegin" delay="0">
+                          <p:tn val="2"/>
+                        </p:cond>
+                      </p:stCondLst>
+                      <p:childTnLst>
+                        <p:par>
+                          <p:cTn id="4" fill="hold">
+                            <p:stCondLst>
+                              <p:cond delay="0"/>
+                            </p:stCondLst>
+                            <p:childTnLst>
+                              <p:par>
+                                <p:cTn id="5" presetID="1" presetClass="entr" presetSubtype="0" fill="hold" nodeType="withEffect">
+                                  <p:stCondLst>
+                                    <p:cond delay="0"/>
+                                  </p:stCondLst>
+                                  <p:childTnLst>
+                                    <p:set>
+                                      <p:cBhvr>
+                                        <p:cTn id="6" dur="1" fill="hold">
+                                          <p:stCondLst>
+                                            <p:cond delay="0"/>
+                                          </p:stCondLst>
+                                        </p:cTn>
+                                        <p:tgtEl>
+                                          <p:spTgt spid="631"/>
+                                        </p:tgtEl>
+                                        <p:attrNameLst>
+                                          <p:attrName>style.visibility</p:attrName>
+                                        </p:attrNameLst>
+                                      </p:cBhvr>
+                                      <p:to>
+                                        <p:strVal val="visible"/>
+                                      </p:to>
+                                    </p:set>
+                                  </p:childTnLst>
+                                </p:cTn>
+                              </p:par>
+                              <p:par>
+                                <p:cTn id="7" presetID="1" presetClass="entr" presetSubtype="0" fill="hold" nodeType="withEffect">
+                                  <p:stCondLst>
+                                    <p:cond delay="0"/>
+                                  </p:stCondLst>
+                                  <p:childTnLst>
+                                    <p:set>
+                                      <p:cBhvr>
+                                        <p:cTn id="8" dur="1" fill="hold">
+                                          <p:stCondLst>
+                                            <p:cond delay="0"/>
+                                          </p:stCondLst>
+                                        </p:cTn>
+                                        <p:tgtEl>
+                                          <p:spTgt spid="650"/>
+                                        </p:tgtEl>
+                                        <p:attrNameLst>
+                                          <p:attrName>style.visibility</p:attrName>
+                                        </p:attrNameLst>
+                                      </p:cBhvr>
+                                      <p:to>
+                                        <p:strVal val="visible"/>
+                                      </p:to>
+                                    </p:set>
+                                  </p:childTnLst>
+                                </p:cTn>
+                              </p:par>
+                            </p:childTnLst>
+                          </p:cTn>
+                        </p:par>
+                      </p:childTnLst>
+                    </p:cTn>
+                  </p:par>
+                  <p:par>
+                    <p:cTn id="9" fill="hold">
+                      <p:stCondLst>
+                        <p:cond delay="indefinite"/>
+                      </p:stCondLst>
+                      <p:childTnLst>
+                        <p:par>
+                          <p:cTn id="10" fill="hold">
+                            <p:stCondLst>
+                              <p:cond delay="0"/>
+                            </p:stCondLst>
+                            <p:childTnLst>
+                              <p:par>
+                                <p:cTn id="11" presetID="1" presetClass="entr" presetSubtype="0" fill="hold" nodeType="clickEffect">
+                                  <p:stCondLst>
+                                    <p:cond delay="0"/>
+                                  </p:stCondLst>
+                                  <p:childTnLst>
+                                    <p:set>
+                                      <p:cBhvr>
+                                        <p:cTn id="12" dur="1" fill="hold">
+                                          <p:stCondLst>
+                                            <p:cond delay="0"/>
+                                          </p:stCondLst>
+                                        </p:cTn>
+                                        <p:tgtEl>
+                                          <p:spTgt spid="404"/>
+                                        </p:tgtEl>
+                                        <p:attrNameLst>
+                                          <p:attrName>style.visibility</p:attrName>
+                                        </p:attrNameLst>
+                                      </p:cBhvr>
+                                      <p:to>
+                                        <p:strVal val="visible"/>
+                                      </p:to>
+                                    </p:set>
+                                  </p:childTnLst>
+                                </p:cTn>
+                              </p:par>
+                              <p:par>
+                                <p:cTn id="13" presetID="1" presetClass="entr" presetSubtype="0" fill="hold" nodeType="withEffect">
+                                  <p:stCondLst>
+                                    <p:cond delay="0"/>
+                                  </p:stCondLst>
+                                  <p:childTnLst>
+                                    <p:set>
+                                      <p:cBhvr>
+                                        <p:cTn id="14" dur="1" fill="hold">
+                                          <p:stCondLst>
+                                            <p:cond delay="0"/>
+                                          </p:stCondLst>
+                                        </p:cTn>
+                                        <p:tgtEl>
+                                          <p:spTgt spid="101"/>
+                                        </p:tgtEl>
+                                        <p:attrNameLst>
+                                          <p:attrName>style.visibility</p:attrName>
+                                        </p:attrNameLst>
+                                      </p:cBhvr>
+                                      <p:to>
+                                        <p:strVal val="visible"/>
+                                      </p:to>
+                                    </p:set>
+                                  </p:childTnLst>
+                                </p:cTn>
+                              </p:par>
+                              <p:par>
+                                <p:cTn id="15" presetID="1" presetClass="entr" presetSubtype="0" fill="hold" nodeType="withEffect">
+                                  <p:stCondLst>
+                                    <p:cond delay="0"/>
+                                  </p:stCondLst>
+                                  <p:childTnLst>
+                                    <p:set>
+                                      <p:cBhvr>
+                                        <p:cTn id="16" dur="1" fill="hold">
+                                          <p:stCondLst>
+                                            <p:cond delay="0"/>
+                                          </p:stCondLst>
+                                        </p:cTn>
+                                        <p:tgtEl>
+                                          <p:spTgt spid="143"/>
+                                        </p:tgtEl>
+                                        <p:attrNameLst>
+                                          <p:attrName>style.visibility</p:attrName>
+                                        </p:attrNameLst>
+                                      </p:cBhvr>
+                                      <p:to>
+                                        <p:strVal val="visible"/>
+                                      </p:to>
+                                    </p:set>
+                                  </p:childTnLst>
+                                </p:cTn>
+                              </p:par>
+                              <p:par>
+                                <p:cTn id="17" presetID="1" presetClass="entr" presetSubtype="0" fill="hold" nodeType="withEffect">
+                                  <p:stCondLst>
+                                    <p:cond delay="0"/>
+                                  </p:stCondLst>
+                                  <p:childTnLst>
+                                    <p:set>
+                                      <p:cBhvr>
+                                        <p:cTn id="18" dur="1" fill="hold">
+                                          <p:stCondLst>
+                                            <p:cond delay="0"/>
+                                          </p:stCondLst>
+                                        </p:cTn>
+                                        <p:tgtEl>
+                                          <p:spTgt spid="161"/>
+                                        </p:tgtEl>
+                                        <p:attrNameLst>
+                                          <p:attrName>style.visibility</p:attrName>
+                                        </p:attrNameLst>
+                                      </p:cBhvr>
+                                      <p:to>
+                                        <p:strVal val="visible"/>
+                                      </p:to>
+                                    </p:set>
+                                  </p:childTnLst>
+                                </p:cTn>
+                              </p:par>
+                            </p:childTnLst>
+                          </p:cTn>
+                        </p:par>
+                      </p:childTnLst>
+                    </p:cTn>
+                  </p:par>
+                  <p:par>
+                    <p:cTn id="19" fill="hold">
+                      <p:stCondLst>
+                        <p:cond delay="indefinite"/>
+                      </p:stCondLst>
+                      <p:childTnLst>
+                        <p:par>
+                          <p:cTn id="20" fill="hold">
+                            <p:stCondLst>
+                              <p:cond delay="0"/>
+                            </p:stCondLst>
+                            <p:childTnLst>
+                              <p:par>
+                                <p:cTn id="21" presetID="1" presetClass="entr" presetSubtype="0" fill="hold" nodeType="clickEffect">
+                                  <p:stCondLst>
+                                    <p:cond delay="0"/>
+                                  </p:stCondLst>
+                                  <p:childTnLst>
+                                    <p:set>
+                                      <p:cBhvr>
+                                        <p:cTn id="22" dur="1" fill="hold">
+                                          <p:stCondLst>
+                                            <p:cond delay="0"/>
+                                          </p:stCondLst>
+                                        </p:cTn>
+                                        <p:tgtEl>
+                                          <p:spTgt spid="169"/>
+                                        </p:tgtEl>
+                                        <p:attrNameLst>
+                                          <p:attrName>style.visibility</p:attrName>
+                                        </p:attrNameLst>
+                                      </p:cBhvr>
+                                      <p:to>
+                                        <p:strVal val="visible"/>
+                                      </p:to>
+                                    </p:set>
+                                  </p:childTnLst>
+                                </p:cTn>
+                              </p:par>
+                            </p:childTnLst>
+                          </p:cTn>
+                        </p:par>
+                      </p:childTnLst>
+                    </p:cTn>
+                  </p:par>
+                </p:childTnLst>
+              </p:cTn>
+              <p:prevCondLst>
+                <p:cond evt="onPrev" delay="0">
+                  <p:tgtEl>
+                    <p:sldTgt/>
+                  </p:tgtEl>
+                </p:cond>
+              </p:prevCondLst>
+              <p:nextCondLst>
+                <p:cond evt="onNext" delay="0">
+                  <p:tgtEl>
+                    <p:sldTgt/>
+                  </p:tgtEl>
+                </p:cond>
+              </p:nextCondLst>
+            </p:seq>
+          </p:childTnLst>
+        </p:cTn>
+      </p:par>
+    </p:tnLst>
+  </p:timing>
+</p:sld>
+</file>
+
+<file path=ppt/slides/slide5.xml><?xml version="1.0" encoding="utf-8"?>
+<p:sld xmlns:a="http://schemas.openxmlformats.org/drawingml/2006/main" xmlns:r="http://schemas.openxmlformats.org/officeDocument/2006/relationships" xmlns:p="http://schemas.openxmlformats.org/presentationml/2006/main">
+  <p:cSld>
+    <p:spTree>
+      <p:nvGrpSpPr>
+        <p:cNvPr id="1" name=""/>
+        <p:cNvGrpSpPr/>
+        <p:nvPr/>
+      </p:nvGrpSpPr>
+      <p:grpSpPr>
+        <a:xfrm>
+          <a:off x="0" y="0"/>
+          <a:ext cx="0" cy="0"/>
+          <a:chOff x="0" y="0"/>
+          <a:chExt cx="0" cy="0"/>
+        </a:xfrm>
+      </p:grpSpPr>
       <p:sp>
         <p:nvSpPr>
           <p:cNvPr id="22" name="Title 21"/>
@@ -35242,7 +39861,7 @@
 </p:sld>
 </file>
 
-<file path=ppt/slides/slide5.xml><?xml version="1.0" encoding="utf-8"?>
+<file path=ppt/slides/slide6.xml><?xml version="1.0" encoding="utf-8"?>
 <p:sld xmlns:a="http://schemas.openxmlformats.org/drawingml/2006/main" xmlns:r="http://schemas.openxmlformats.org/officeDocument/2006/relationships" xmlns:p="http://schemas.openxmlformats.org/presentationml/2006/main">
   <p:cSld>
     <p:spTree>
@@ -42528,7 +47147,7 @@
 </p:sld>
 </file>
 
-<file path=ppt/slides/slide6.xml><?xml version="1.0" encoding="utf-8"?>
+<file path=ppt/slides/slide7.xml><?xml version="1.0" encoding="utf-8"?>
 <p:sld xmlns:a="http://schemas.openxmlformats.org/drawingml/2006/main" xmlns:r="http://schemas.openxmlformats.org/officeDocument/2006/relationships" xmlns:p="http://schemas.openxmlformats.org/presentationml/2006/main">
   <p:cSld>
     <p:spTree>
@@ -42593,7 +47212,7 @@
 </p:sld>
 </file>
 
-<file path=ppt/slides/slide7.xml><?xml version="1.0" encoding="utf-8"?>
+<file path=ppt/slides/slide8.xml><?xml version="1.0" encoding="utf-8"?>
 <p:sld xmlns:a="http://schemas.openxmlformats.org/drawingml/2006/main" xmlns:r="http://schemas.openxmlformats.org/officeDocument/2006/relationships" xmlns:p="http://schemas.openxmlformats.org/presentationml/2006/main">
   <p:cSld>
     <p:spTree>

</xml_diff>